<commit_message>
final draft of Team presentation
</commit_message>
<xml_diff>
--- a/05 Team/ER Presentation/Team Presentation .pptx
+++ b/05 Team/ER Presentation/Team Presentation .pptx
@@ -19,19 +19,22 @@
     <p:sldId id="264" r:id="rId13"/>
     <p:sldId id="265" r:id="rId14"/>
     <p:sldId id="266" r:id="rId15"/>
+    <p:sldId id="267" r:id="rId16"/>
+    <p:sldId id="268" r:id="rId17"/>
+    <p:sldId id="269" r:id="rId18"/>
   </p:sldIdLst>
   <p:sldSz cy="5143500" cx="9144000"/>
   <p:notesSz cx="6858000" cy="9144000"/>
   <p:embeddedFontLst>
     <p:embeddedFont>
       <p:font typeface="Amatic SC"/>
-      <p:regular r:id="rId16"/>
-      <p:bold r:id="rId17"/>
+      <p:regular r:id="rId19"/>
+      <p:bold r:id="rId20"/>
     </p:embeddedFont>
     <p:embeddedFont>
       <p:font typeface="Source Code Pro"/>
-      <p:regular r:id="rId18"/>
-      <p:bold r:id="rId19"/>
+      <p:regular r:id="rId21"/>
+      <p:bold r:id="rId22"/>
     </p:embeddedFont>
   </p:embeddedFontLst>
   <p:defaultTextStyle>
@@ -488,7 +491,7 @@
   <p:cSld>
     <p:spTree>
       <p:nvGrpSpPr>
-        <p:cNvPr id="120" name="Shape 120"/>
+        <p:cNvPr id="116" name="Shape 116"/>
         <p:cNvGrpSpPr/>
         <p:nvPr/>
       </p:nvGrpSpPr>
@@ -502,7 +505,7 @@
       </p:grpSpPr>
       <p:sp>
         <p:nvSpPr>
-          <p:cNvPr id="121" name="Shape 121"/>
+          <p:cNvPr id="117" name="Shape 117"/>
           <p:cNvSpPr/>
           <p:nvPr>
             <p:ph idx="2" type="sldImg"/>
@@ -536,7 +539,7 @@
       </p:sp>
       <p:sp>
         <p:nvSpPr>
-          <p:cNvPr id="122" name="Shape 122"/>
+          <p:cNvPr id="118" name="Shape 118"/>
           <p:cNvSpPr txBox="1"/>
           <p:nvPr>
             <p:ph idx="1" type="body"/>
@@ -564,9 +567,9 @@
               <a:buNone/>
             </a:pPr>
             <a:r>
-              <a:t/>
-            </a:r>
-            <a:endParaRPr/>
+              <a:rPr lang="en"/>
+              <a:t>Dalya- *Full participation, because each store must have 2 or more departments</a:t>
+            </a:r>
           </a:p>
         </p:txBody>
       </p:sp>
@@ -605,8 +608,8 @@
         </p:nvSpPr>
         <p:spPr>
           <a:xfrm>
-            <a:off x="381300" y="685800"/>
-            <a:ext cx="6096000" cy="3429000"/>
+            <a:off x="381187" y="685800"/>
+            <a:ext cx="6096299" cy="3429000"/>
           </a:xfrm>
           <a:custGeom>
             <a:pathLst>
@@ -652,7 +655,292 @@
           </a:bodyPr>
           <a:lstStyle/>
           <a:p>
+            <a:pPr lvl="0" rtl="0">
+              <a:spcBef>
+                <a:spcPts val="0"/>
+              </a:spcBef>
+              <a:buNone/>
+            </a:pPr>
+            <a:r>
+              <a:t/>
+            </a:r>
+            <a:endParaRPr/>
+          </a:p>
+        </p:txBody>
+      </p:sp>
+    </p:spTree>
+  </p:cSld>
+  <p:clrMapOvr>
+    <a:masterClrMapping/>
+  </p:clrMapOvr>
+</p:notes>
+</file>
+
+<file path=ppt/notesSlides/notesSlide12.xml><?xml version="1.0" encoding="utf-8"?>
+<p:notes xmlns:a="http://schemas.openxmlformats.org/drawingml/2006/main" xmlns:r="http://schemas.openxmlformats.org/officeDocument/2006/relationships" xmlns:mc="http://schemas.openxmlformats.org/markup-compatibility/2006" xmlns:mv="urn:schemas-microsoft-com:mac:vml" xmlns:p="http://schemas.openxmlformats.org/presentationml/2006/main" xmlns:c="http://schemas.openxmlformats.org/drawingml/2006/chart" xmlns:dgm="http://schemas.openxmlformats.org/drawingml/2006/diagram" xmlns:o="urn:schemas-microsoft-com:office:office" xmlns:v="urn:schemas-microsoft-com:vml" xmlns:pvml="urn:schemas-microsoft-com:office:powerpoint" xmlns:com="http://schemas.openxmlformats.org/drawingml/2006/compatibility" xmlns:p14="http://schemas.microsoft.com/office/powerpoint/2010/main" showMasterPhAnim="0" showMasterSp="0">
+  <p:cSld>
+    <p:spTree>
+      <p:nvGrpSpPr>
+        <p:cNvPr id="130" name="Shape 130"/>
+        <p:cNvGrpSpPr/>
+        <p:nvPr/>
+      </p:nvGrpSpPr>
+      <p:grpSpPr>
+        <a:xfrm>
+          <a:off x="0" y="0"/>
+          <a:ext cx="0" cy="0"/>
+          <a:chOff x="0" y="0"/>
+          <a:chExt cx="0" cy="0"/>
+        </a:xfrm>
+      </p:grpSpPr>
+      <p:sp>
+        <p:nvSpPr>
+          <p:cNvPr id="131" name="Shape 131"/>
+          <p:cNvSpPr/>
+          <p:nvPr>
+            <p:ph idx="2" type="sldImg"/>
+          </p:nvPr>
+        </p:nvSpPr>
+        <p:spPr>
+          <a:xfrm>
+            <a:off x="381300" y="685800"/>
+            <a:ext cx="6096000" cy="3429000"/>
+          </a:xfrm>
+          <a:custGeom>
+            <a:pathLst>
+              <a:path extrusionOk="0" h="120000" w="120000">
+                <a:moveTo>
+                  <a:pt x="0" y="0"/>
+                </a:moveTo>
+                <a:lnTo>
+                  <a:pt x="120000" y="0"/>
+                </a:lnTo>
+                <a:lnTo>
+                  <a:pt x="120000" y="120000"/>
+                </a:lnTo>
+                <a:lnTo>
+                  <a:pt x="0" y="120000"/>
+                </a:lnTo>
+                <a:close/>
+              </a:path>
+            </a:pathLst>
+          </a:custGeom>
+        </p:spPr>
+      </p:sp>
+      <p:sp>
+        <p:nvSpPr>
+          <p:cNvPr id="132" name="Shape 132"/>
+          <p:cNvSpPr txBox="1"/>
+          <p:nvPr>
+            <p:ph idx="1" type="body"/>
+          </p:nvPr>
+        </p:nvSpPr>
+        <p:spPr>
+          <a:xfrm>
+            <a:off x="685800" y="4343400"/>
+            <a:ext cx="5486400" cy="4114800"/>
+          </a:xfrm>
+          <a:prstGeom prst="rect">
+            <a:avLst/>
+          </a:prstGeom>
+        </p:spPr>
+        <p:txBody>
+          <a:bodyPr anchorCtr="0" anchor="t" bIns="91425" lIns="91425" rIns="91425" tIns="91425">
+            <a:noAutofit/>
+          </a:bodyPr>
+          <a:lstStyle/>
+          <a:p>
             <a:pPr lvl="0">
+              <a:spcBef>
+                <a:spcPts val="0"/>
+              </a:spcBef>
+              <a:buNone/>
+            </a:pPr>
+            <a:r>
+              <a:t/>
+            </a:r>
+            <a:endParaRPr/>
+          </a:p>
+        </p:txBody>
+      </p:sp>
+    </p:spTree>
+  </p:cSld>
+  <p:clrMapOvr>
+    <a:masterClrMapping/>
+  </p:clrMapOvr>
+</p:notes>
+</file>
+
+<file path=ppt/notesSlides/notesSlide13.xml><?xml version="1.0" encoding="utf-8"?>
+<p:notes xmlns:a="http://schemas.openxmlformats.org/drawingml/2006/main" xmlns:r="http://schemas.openxmlformats.org/officeDocument/2006/relationships" xmlns:mc="http://schemas.openxmlformats.org/markup-compatibility/2006" xmlns:mv="urn:schemas-microsoft-com:mac:vml" xmlns:p="http://schemas.openxmlformats.org/presentationml/2006/main" xmlns:c="http://schemas.openxmlformats.org/drawingml/2006/chart" xmlns:dgm="http://schemas.openxmlformats.org/drawingml/2006/diagram" xmlns:o="urn:schemas-microsoft-com:office:office" xmlns:v="urn:schemas-microsoft-com:vml" xmlns:pvml="urn:schemas-microsoft-com:office:powerpoint" xmlns:com="http://schemas.openxmlformats.org/drawingml/2006/compatibility" xmlns:p14="http://schemas.microsoft.com/office/powerpoint/2010/main" showMasterPhAnim="0" showMasterSp="0">
+  <p:cSld>
+    <p:spTree>
+      <p:nvGrpSpPr>
+        <p:cNvPr id="136" name="Shape 136"/>
+        <p:cNvGrpSpPr/>
+        <p:nvPr/>
+      </p:nvGrpSpPr>
+      <p:grpSpPr>
+        <a:xfrm>
+          <a:off x="0" y="0"/>
+          <a:ext cx="0" cy="0"/>
+          <a:chOff x="0" y="0"/>
+          <a:chExt cx="0" cy="0"/>
+        </a:xfrm>
+      </p:grpSpPr>
+      <p:sp>
+        <p:nvSpPr>
+          <p:cNvPr id="137" name="Shape 137"/>
+          <p:cNvSpPr/>
+          <p:nvPr>
+            <p:ph idx="2" type="sldImg"/>
+          </p:nvPr>
+        </p:nvSpPr>
+        <p:spPr>
+          <a:xfrm>
+            <a:off x="381300" y="685800"/>
+            <a:ext cx="6096000" cy="3429000"/>
+          </a:xfrm>
+          <a:custGeom>
+            <a:pathLst>
+              <a:path extrusionOk="0" h="120000" w="120000">
+                <a:moveTo>
+                  <a:pt x="0" y="0"/>
+                </a:moveTo>
+                <a:lnTo>
+                  <a:pt x="120000" y="0"/>
+                </a:lnTo>
+                <a:lnTo>
+                  <a:pt x="120000" y="120000"/>
+                </a:lnTo>
+                <a:lnTo>
+                  <a:pt x="0" y="120000"/>
+                </a:lnTo>
+                <a:close/>
+              </a:path>
+            </a:pathLst>
+          </a:custGeom>
+        </p:spPr>
+      </p:sp>
+      <p:sp>
+        <p:nvSpPr>
+          <p:cNvPr id="138" name="Shape 138"/>
+          <p:cNvSpPr txBox="1"/>
+          <p:nvPr>
+            <p:ph idx="1" type="body"/>
+          </p:nvPr>
+        </p:nvSpPr>
+        <p:spPr>
+          <a:xfrm>
+            <a:off x="685800" y="4343400"/>
+            <a:ext cx="5486400" cy="4114800"/>
+          </a:xfrm>
+          <a:prstGeom prst="rect">
+            <a:avLst/>
+          </a:prstGeom>
+        </p:spPr>
+        <p:txBody>
+          <a:bodyPr anchorCtr="0" anchor="t" bIns="91425" lIns="91425" rIns="91425" tIns="91425">
+            <a:noAutofit/>
+          </a:bodyPr>
+          <a:lstStyle/>
+          <a:p>
+            <a:pPr lvl="0" rtl="0">
+              <a:spcBef>
+                <a:spcPts val="0"/>
+              </a:spcBef>
+              <a:buNone/>
+            </a:pPr>
+            <a:r>
+              <a:t/>
+            </a:r>
+            <a:endParaRPr/>
+          </a:p>
+        </p:txBody>
+      </p:sp>
+    </p:spTree>
+  </p:cSld>
+  <p:clrMapOvr>
+    <a:masterClrMapping/>
+  </p:clrMapOvr>
+</p:notes>
+</file>
+
+<file path=ppt/notesSlides/notesSlide14.xml><?xml version="1.0" encoding="utf-8"?>
+<p:notes xmlns:a="http://schemas.openxmlformats.org/drawingml/2006/main" xmlns:r="http://schemas.openxmlformats.org/officeDocument/2006/relationships" xmlns:mc="http://schemas.openxmlformats.org/markup-compatibility/2006" xmlns:mv="urn:schemas-microsoft-com:mac:vml" xmlns:p="http://schemas.openxmlformats.org/presentationml/2006/main" xmlns:c="http://schemas.openxmlformats.org/drawingml/2006/chart" xmlns:dgm="http://schemas.openxmlformats.org/drawingml/2006/diagram" xmlns:o="urn:schemas-microsoft-com:office:office" xmlns:v="urn:schemas-microsoft-com:vml" xmlns:pvml="urn:schemas-microsoft-com:office:powerpoint" xmlns:com="http://schemas.openxmlformats.org/drawingml/2006/compatibility" xmlns:p14="http://schemas.microsoft.com/office/powerpoint/2010/main" showMasterPhAnim="0" showMasterSp="0">
+  <p:cSld>
+    <p:spTree>
+      <p:nvGrpSpPr>
+        <p:cNvPr id="143" name="Shape 143"/>
+        <p:cNvGrpSpPr/>
+        <p:nvPr/>
+      </p:nvGrpSpPr>
+      <p:grpSpPr>
+        <a:xfrm>
+          <a:off x="0" y="0"/>
+          <a:ext cx="0" cy="0"/>
+          <a:chOff x="0" y="0"/>
+          <a:chExt cx="0" cy="0"/>
+        </a:xfrm>
+      </p:grpSpPr>
+      <p:sp>
+        <p:nvSpPr>
+          <p:cNvPr id="144" name="Shape 144"/>
+          <p:cNvSpPr/>
+          <p:nvPr>
+            <p:ph idx="2" type="sldImg"/>
+          </p:nvPr>
+        </p:nvSpPr>
+        <p:spPr>
+          <a:xfrm>
+            <a:off x="381300" y="685800"/>
+            <a:ext cx="6096000" cy="3429000"/>
+          </a:xfrm>
+          <a:custGeom>
+            <a:pathLst>
+              <a:path extrusionOk="0" h="120000" w="120000">
+                <a:moveTo>
+                  <a:pt x="0" y="0"/>
+                </a:moveTo>
+                <a:lnTo>
+                  <a:pt x="120000" y="0"/>
+                </a:lnTo>
+                <a:lnTo>
+                  <a:pt x="120000" y="120000"/>
+                </a:lnTo>
+                <a:lnTo>
+                  <a:pt x="0" y="120000"/>
+                </a:lnTo>
+                <a:close/>
+              </a:path>
+            </a:pathLst>
+          </a:custGeom>
+        </p:spPr>
+      </p:sp>
+      <p:sp>
+        <p:nvSpPr>
+          <p:cNvPr id="145" name="Shape 145"/>
+          <p:cNvSpPr txBox="1"/>
+          <p:nvPr>
+            <p:ph idx="1" type="body"/>
+          </p:nvPr>
+        </p:nvSpPr>
+        <p:spPr>
+          <a:xfrm>
+            <a:off x="685800" y="4343400"/>
+            <a:ext cx="5486400" cy="4114800"/>
+          </a:xfrm>
+          <a:prstGeom prst="rect">
+            <a:avLst/>
+          </a:prstGeom>
+        </p:spPr>
+        <p:txBody>
+          <a:bodyPr anchorCtr="0" anchor="t" bIns="91425" lIns="91425" rIns="91425" tIns="91425">
+            <a:noAutofit/>
+          </a:bodyPr>
+          <a:lstStyle/>
+          <a:p>
+            <a:pPr lvl="0" rtl="0">
               <a:spcBef>
                 <a:spcPts val="0"/>
               </a:spcBef>
@@ -830,7 +1118,7 @@
         <p:spPr>
           <a:xfrm>
             <a:off x="685800" y="4343400"/>
-            <a:ext cx="5486400" cy="4114800"/>
+            <a:ext cx="5486399" cy="4114800"/>
           </a:xfrm>
           <a:prstGeom prst="rect">
             <a:avLst/>
@@ -843,78 +1131,6 @@
           <a:lstStyle/>
           <a:p>
             <a:pPr lvl="0">
-              <a:spcBef>
-                <a:spcPts val="0"/>
-              </a:spcBef>
-              <a:buNone/>
-            </a:pPr>
-            <a:r>
-              <a:t/>
-            </a:r>
-            <a:endParaRPr/>
-          </a:p>
-          <a:p>
-            <a:pPr lvl="0">
-              <a:spcBef>
-                <a:spcPts val="0"/>
-              </a:spcBef>
-              <a:buNone/>
-            </a:pPr>
-            <a:r>
-              <a:rPr lang="en"/>
-              <a:t>Ortagus Winfrey-Analyst</a:t>
-            </a:r>
-          </a:p>
-          <a:p>
-            <a:pPr lvl="0">
-              <a:spcBef>
-                <a:spcPts val="0"/>
-              </a:spcBef>
-              <a:buNone/>
-            </a:pPr>
-            <a:r>
-              <a:rPr lang="en"/>
-              <a:t>Ryan OCampo-Architecture/backend</a:t>
-            </a:r>
-          </a:p>
-          <a:p>
-            <a:pPr lvl="0">
-              <a:spcBef>
-                <a:spcPts val="0"/>
-              </a:spcBef>
-              <a:buNone/>
-            </a:pPr>
-            <a:r>
-              <a:rPr lang="en"/>
-              <a:t>Mychal Terfie-Backend/testing</a:t>
-            </a:r>
-          </a:p>
-          <a:p>
-            <a:pPr lvl="0">
-              <a:spcBef>
-                <a:spcPts val="0"/>
-              </a:spcBef>
-              <a:buNone/>
-            </a:pPr>
-            <a:r>
-              <a:rPr lang="en"/>
-              <a:t>Shenila Daredia-Frontend/mysql development</a:t>
-            </a:r>
-          </a:p>
-          <a:p>
-            <a:pPr lvl="0">
-              <a:spcBef>
-                <a:spcPts val="0"/>
-              </a:spcBef>
-              <a:buNone/>
-            </a:pPr>
-            <a:r>
-              <a:rPr lang="en"/>
-              <a:t>Dalya Khatun-Frontend/backend; testing </a:t>
-            </a:r>
-          </a:p>
-          <a:p>
-            <a:pPr lvl="0" rtl="0">
               <a:spcBef>
                 <a:spcPts val="0"/>
               </a:spcBef>
@@ -940,7 +1156,7 @@
   <p:cSld>
     <p:spTree>
       <p:nvGrpSpPr>
-        <p:cNvPr id="70" name="Shape 70"/>
+        <p:cNvPr id="69" name="Shape 69"/>
         <p:cNvGrpSpPr/>
         <p:nvPr/>
       </p:nvGrpSpPr>
@@ -954,7 +1170,7 @@
       </p:grpSpPr>
       <p:sp>
         <p:nvSpPr>
-          <p:cNvPr id="71" name="Shape 71"/>
+          <p:cNvPr id="70" name="Shape 70"/>
           <p:cNvSpPr/>
           <p:nvPr>
             <p:ph idx="2" type="sldImg"/>
@@ -988,7 +1204,7 @@
       </p:sp>
       <p:sp>
         <p:nvSpPr>
-          <p:cNvPr id="72" name="Shape 72"/>
+          <p:cNvPr id="71" name="Shape 71"/>
           <p:cNvSpPr txBox="1"/>
           <p:nvPr>
             <p:ph idx="1" type="body"/>
@@ -997,7 +1213,7 @@
         <p:spPr>
           <a:xfrm>
             <a:off x="685800" y="4343400"/>
-            <a:ext cx="5486399" cy="4114800"/>
+            <a:ext cx="5486400" cy="4114800"/>
           </a:xfrm>
           <a:prstGeom prst="rect">
             <a:avLst/>
@@ -1010,6 +1226,78 @@
           <a:lstStyle/>
           <a:p>
             <a:pPr lvl="0">
+              <a:spcBef>
+                <a:spcPts val="0"/>
+              </a:spcBef>
+              <a:buNone/>
+            </a:pPr>
+            <a:r>
+              <a:t/>
+            </a:r>
+            <a:endParaRPr/>
+          </a:p>
+          <a:p>
+            <a:pPr lvl="0">
+              <a:spcBef>
+                <a:spcPts val="0"/>
+              </a:spcBef>
+              <a:buNone/>
+            </a:pPr>
+            <a:r>
+              <a:rPr lang="en"/>
+              <a:t>Ortagus Winfrey-Analyst</a:t>
+            </a:r>
+          </a:p>
+          <a:p>
+            <a:pPr lvl="0">
+              <a:spcBef>
+                <a:spcPts val="0"/>
+              </a:spcBef>
+              <a:buNone/>
+            </a:pPr>
+            <a:r>
+              <a:rPr lang="en"/>
+              <a:t>Ryan OCampo-Architecture/backend</a:t>
+            </a:r>
+          </a:p>
+          <a:p>
+            <a:pPr lvl="0">
+              <a:spcBef>
+                <a:spcPts val="0"/>
+              </a:spcBef>
+              <a:buNone/>
+            </a:pPr>
+            <a:r>
+              <a:rPr lang="en"/>
+              <a:t>Mychal Terfie-Backend/testing</a:t>
+            </a:r>
+          </a:p>
+          <a:p>
+            <a:pPr lvl="0">
+              <a:spcBef>
+                <a:spcPts val="0"/>
+              </a:spcBef>
+              <a:buNone/>
+            </a:pPr>
+            <a:r>
+              <a:rPr lang="en"/>
+              <a:t>Shenila Daredia-Frontend/mysql development</a:t>
+            </a:r>
+          </a:p>
+          <a:p>
+            <a:pPr lvl="0">
+              <a:spcBef>
+                <a:spcPts val="0"/>
+              </a:spcBef>
+              <a:buNone/>
+            </a:pPr>
+            <a:r>
+              <a:rPr lang="en"/>
+              <a:t>Dalya Khatun-Frontend/backend; testing </a:t>
+            </a:r>
+          </a:p>
+          <a:p>
+            <a:pPr lvl="0" rtl="0">
               <a:spcBef>
                 <a:spcPts val="0"/>
               </a:spcBef>
@@ -1092,7 +1380,7 @@
         <p:spPr>
           <a:xfrm>
             <a:off x="685800" y="4343400"/>
-            <a:ext cx="5486399" cy="4114800"/>
+            <a:ext cx="5486400" cy="4114800"/>
           </a:xfrm>
           <a:prstGeom prst="rect">
             <a:avLst/>
@@ -1104,16 +1392,16 @@
           </a:bodyPr>
           <a:lstStyle/>
           <a:p>
-            <a:pPr lvl="0">
-              <a:spcBef>
-                <a:spcPts val="0"/>
-              </a:spcBef>
-              <a:buNone/>
-            </a:pPr>
-            <a:r>
-              <a:rPr lang="en"/>
-              <a:t>Ortagus</a:t>
-            </a:r>
+            <a:pPr lvl="0" rtl="0">
+              <a:spcBef>
+                <a:spcPts val="0"/>
+              </a:spcBef>
+              <a:buNone/>
+            </a:pPr>
+            <a:r>
+              <a:t/>
+            </a:r>
+            <a:endParaRPr/>
           </a:p>
         </p:txBody>
       </p:sp>
@@ -1130,7 +1418,7 @@
   <p:cSld>
     <p:spTree>
       <p:nvGrpSpPr>
-        <p:cNvPr id="84" name="Shape 84"/>
+        <p:cNvPr id="80" name="Shape 80"/>
         <p:cNvGrpSpPr/>
         <p:nvPr/>
       </p:nvGrpSpPr>
@@ -1144,7 +1432,7 @@
       </p:grpSpPr>
       <p:sp>
         <p:nvSpPr>
-          <p:cNvPr id="85" name="Shape 85"/>
+          <p:cNvPr id="81" name="Shape 81"/>
           <p:cNvSpPr/>
           <p:nvPr>
             <p:ph idx="2" type="sldImg"/>
@@ -1178,7 +1466,7 @@
       </p:sp>
       <p:sp>
         <p:nvSpPr>
-          <p:cNvPr id="86" name="Shape 86"/>
+          <p:cNvPr id="82" name="Shape 82"/>
           <p:cNvSpPr txBox="1"/>
           <p:nvPr>
             <p:ph idx="1" type="body"/>
@@ -1187,7 +1475,7 @@
         <p:spPr>
           <a:xfrm>
             <a:off x="685800" y="4343400"/>
-            <a:ext cx="5486400" cy="4114800"/>
+            <a:ext cx="5486399" cy="4114800"/>
           </a:xfrm>
           <a:prstGeom prst="rect">
             <a:avLst/>
@@ -1199,7 +1487,7 @@
           </a:bodyPr>
           <a:lstStyle/>
           <a:p>
-            <a:pPr lvl="0" rtl="0">
+            <a:pPr lvl="0">
               <a:spcBef>
                 <a:spcPts val="0"/>
               </a:spcBef>
@@ -1207,7 +1495,7 @@
             </a:pPr>
             <a:r>
               <a:rPr lang="en"/>
-              <a:t>Shenila</a:t>
+              <a:t>Ortagus; </a:t>
             </a:r>
           </a:p>
         </p:txBody>
@@ -1225,7 +1513,7 @@
   <p:cSld>
     <p:spTree>
       <p:nvGrpSpPr>
-        <p:cNvPr id="93" name="Shape 93"/>
+        <p:cNvPr id="89" name="Shape 89"/>
         <p:cNvGrpSpPr/>
         <p:nvPr/>
       </p:nvGrpSpPr>
@@ -1239,7 +1527,7 @@
       </p:grpSpPr>
       <p:sp>
         <p:nvSpPr>
-          <p:cNvPr id="94" name="Shape 94"/>
+          <p:cNvPr id="90" name="Shape 90"/>
           <p:cNvSpPr/>
           <p:nvPr>
             <p:ph idx="2" type="sldImg"/>
@@ -1273,7 +1561,7 @@
       </p:sp>
       <p:sp>
         <p:nvSpPr>
-          <p:cNvPr id="95" name="Shape 95"/>
+          <p:cNvPr id="91" name="Shape 91"/>
           <p:cNvSpPr txBox="1"/>
           <p:nvPr>
             <p:ph idx="1" type="body"/>
@@ -1302,7 +1590,7 @@
             </a:pPr>
             <a:r>
               <a:rPr lang="en"/>
-              <a:t>Ryan</a:t>
+              <a:t>Shenila- *full participation because each position must be inside at least one department</a:t>
             </a:r>
           </a:p>
         </p:txBody>
@@ -1320,7 +1608,7 @@
   <p:cSld>
     <p:spTree>
       <p:nvGrpSpPr>
-        <p:cNvPr id="102" name="Shape 102"/>
+        <p:cNvPr id="98" name="Shape 98"/>
         <p:cNvGrpSpPr/>
         <p:nvPr/>
       </p:nvGrpSpPr>
@@ -1334,7 +1622,7 @@
       </p:grpSpPr>
       <p:sp>
         <p:nvSpPr>
-          <p:cNvPr id="103" name="Shape 103"/>
+          <p:cNvPr id="99" name="Shape 99"/>
           <p:cNvSpPr/>
           <p:nvPr>
             <p:ph idx="2" type="sldImg"/>
@@ -1368,7 +1656,7 @@
       </p:sp>
       <p:sp>
         <p:nvSpPr>
-          <p:cNvPr id="104" name="Shape 104"/>
+          <p:cNvPr id="100" name="Shape 100"/>
           <p:cNvSpPr txBox="1"/>
           <p:nvPr>
             <p:ph idx="1" type="body"/>
@@ -1397,7 +1685,7 @@
             </a:pPr>
             <a:r>
               <a:rPr lang="en"/>
-              <a:t>Mechal</a:t>
+              <a:t>Ryan- *full participation, because each salary must be associated with a position</a:t>
             </a:r>
           </a:p>
         </p:txBody>
@@ -1415,7 +1703,7 @@
   <p:cSld>
     <p:spTree>
       <p:nvGrpSpPr>
-        <p:cNvPr id="111" name="Shape 111"/>
+        <p:cNvPr id="107" name="Shape 107"/>
         <p:cNvGrpSpPr/>
         <p:nvPr/>
       </p:nvGrpSpPr>
@@ -1429,7 +1717,7 @@
       </p:grpSpPr>
       <p:sp>
         <p:nvSpPr>
-          <p:cNvPr id="112" name="Shape 112"/>
+          <p:cNvPr id="108" name="Shape 108"/>
           <p:cNvSpPr/>
           <p:nvPr>
             <p:ph idx="2" type="sldImg"/>
@@ -1463,7 +1751,7 @@
       </p:sp>
       <p:sp>
         <p:nvSpPr>
-          <p:cNvPr id="113" name="Shape 113"/>
+          <p:cNvPr id="109" name="Shape 109"/>
           <p:cNvSpPr txBox="1"/>
           <p:nvPr>
             <p:ph idx="1" type="body"/>
@@ -1492,7 +1780,7 @@
             </a:pPr>
             <a:r>
               <a:rPr lang="en"/>
-              <a:t>Dalya</a:t>
+              <a:t>Mechal- *Partial participation, because one store can have different or more departments in comparison to another</a:t>
             </a:r>
           </a:p>
         </p:txBody>
@@ -5369,7 +5657,7 @@
   <p:cSld>
     <p:spTree>
       <p:nvGrpSpPr>
-        <p:cNvPr id="123" name="Shape 123"/>
+        <p:cNvPr id="119" name="Shape 119"/>
         <p:cNvGrpSpPr/>
         <p:nvPr/>
       </p:nvGrpSpPr>
@@ -5383,7 +5671,7 @@
       </p:grpSpPr>
       <p:sp>
         <p:nvSpPr>
-          <p:cNvPr id="124" name="Shape 124"/>
+          <p:cNvPr id="120" name="Shape 120"/>
           <p:cNvSpPr txBox="1"/>
           <p:nvPr>
             <p:ph type="title"/>
@@ -5391,44 +5679,229 @@
         </p:nvSpPr>
         <p:spPr>
           <a:xfrm>
-            <a:off x="99750" y="111000"/>
-            <a:ext cx="8944500" cy="4921500"/>
+            <a:off x="4877475" y="296900"/>
+            <a:ext cx="3981900" cy="629100"/>
           </a:xfrm>
           <a:prstGeom prst="rect">
             <a:avLst/>
           </a:prstGeom>
         </p:spPr>
         <p:txBody>
-          <a:bodyPr anchorCtr="0" anchor="ctr" bIns="91425" lIns="91425" rIns="91425" tIns="91425">
+          <a:bodyPr anchorCtr="0" anchor="t" bIns="91425" lIns="91425" rIns="91425" tIns="91425">
             <a:noAutofit/>
           </a:bodyPr>
           <a:lstStyle/>
           <a:p>
-            <a:pPr lvl="0">
-              <a:spcBef>
-                <a:spcPts val="0"/>
-              </a:spcBef>
-              <a:buNone/>
-            </a:pPr>
-            <a:r>
-              <a:rPr lang="en"/>
-              <a:t>ER Diagram</a:t>
-            </a:r>
-          </a:p>
-          <a:p>
-            <a:pPr lvl="0" rtl="0" algn="l">
-              <a:spcBef>
-                <a:spcPts val="0"/>
-              </a:spcBef>
+            <a:pPr lvl="0" rtl="0">
+              <a:spcBef>
+                <a:spcPts val="0"/>
+              </a:spcBef>
+              <a:buNone/>
+            </a:pPr>
+            <a:r>
+              <a:rPr lang="en" sz="3600"/>
+              <a:t>&lt;Store&gt;</a:t>
+            </a:r>
+          </a:p>
+        </p:txBody>
+      </p:sp>
+      <p:sp>
+        <p:nvSpPr>
+          <p:cNvPr id="121" name="Shape 121"/>
+          <p:cNvSpPr txBox="1"/>
+          <p:nvPr>
+            <p:ph idx="1" type="body"/>
+          </p:nvPr>
+        </p:nvSpPr>
+        <p:spPr>
+          <a:xfrm>
+            <a:off x="4877475" y="1275625"/>
+            <a:ext cx="3981900" cy="1033800"/>
+          </a:xfrm>
+          <a:prstGeom prst="rect">
+            <a:avLst/>
+          </a:prstGeom>
+        </p:spPr>
+        <p:txBody>
+          <a:bodyPr anchorCtr="0" anchor="t" bIns="91425" lIns="91425" rIns="91425" tIns="91425">
+            <a:noAutofit/>
+          </a:bodyPr>
+          <a:lstStyle/>
+          <a:p>
+            <a:pPr lvl="0" rtl="0">
+              <a:spcBef>
+                <a:spcPts val="0"/>
+              </a:spcBef>
+              <a:spcAft>
+                <a:spcPts val="0"/>
+              </a:spcAft>
+              <a:buNone/>
+            </a:pPr>
+            <a:r>
+              <a:rPr b="1" lang="en" sz="1600"/>
+              <a:t>The location where each employee,position, and department are located.</a:t>
+            </a:r>
+          </a:p>
+          <a:p>
+            <a:pPr lvl="0" rtl="0">
+              <a:spcBef>
+                <a:spcPts val="0"/>
+              </a:spcBef>
+              <a:spcAft>
+                <a:spcPts val="0"/>
+              </a:spcAft>
               <a:buNone/>
             </a:pPr>
             <a:r>
               <a:t/>
             </a:r>
-            <a:endParaRPr/>
+            <a:endParaRPr sz="1400"/>
           </a:p>
         </p:txBody>
       </p:sp>
+      <p:sp>
+        <p:nvSpPr>
+          <p:cNvPr id="122" name="Shape 122"/>
+          <p:cNvSpPr txBox="1"/>
+          <p:nvPr>
+            <p:ph idx="1" type="body"/>
+          </p:nvPr>
+        </p:nvSpPr>
+        <p:spPr>
+          <a:xfrm>
+            <a:off x="4877475" y="2309425"/>
+            <a:ext cx="3981900" cy="1604100"/>
+          </a:xfrm>
+          <a:prstGeom prst="rect">
+            <a:avLst/>
+          </a:prstGeom>
+        </p:spPr>
+        <p:txBody>
+          <a:bodyPr anchorCtr="0" anchor="t" bIns="91425" lIns="91425" rIns="91425" tIns="91425">
+            <a:noAutofit/>
+          </a:bodyPr>
+          <a:lstStyle/>
+          <a:p>
+            <a:pPr lvl="0" rtl="0">
+              <a:spcBef>
+                <a:spcPts val="0"/>
+              </a:spcBef>
+              <a:spcAft>
+                <a:spcPts val="0"/>
+              </a:spcAft>
+              <a:buNone/>
+            </a:pPr>
+            <a:r>
+              <a:rPr b="1" lang="en" sz="1600"/>
+              <a:t>Has a 1:M relation with our &lt;Department&gt; entity </a:t>
+            </a:r>
+          </a:p>
+          <a:p>
+            <a:pPr lvl="0" rtl="0">
+              <a:lnSpc>
+                <a:spcPct val="115000"/>
+              </a:lnSpc>
+              <a:spcBef>
+                <a:spcPts val="0"/>
+              </a:spcBef>
+              <a:spcAft>
+                <a:spcPts val="0"/>
+              </a:spcAft>
+              <a:buNone/>
+            </a:pPr>
+            <a:r>
+              <a:rPr lang="en" sz="1400"/>
+              <a:t>“Individual stores can have many departments and many departments can be located within a store” </a:t>
+            </a:r>
+          </a:p>
+          <a:p>
+            <a:pPr lvl="0" rtl="0">
+              <a:spcBef>
+                <a:spcPts val="0"/>
+              </a:spcBef>
+              <a:spcAft>
+                <a:spcPts val="0"/>
+              </a:spcAft>
+              <a:buNone/>
+            </a:pPr>
+            <a:r>
+              <a:t/>
+            </a:r>
+            <a:endParaRPr sz="1400"/>
+          </a:p>
+        </p:txBody>
+      </p:sp>
+      <p:sp>
+        <p:nvSpPr>
+          <p:cNvPr id="123" name="Shape 123"/>
+          <p:cNvSpPr txBox="1"/>
+          <p:nvPr>
+            <p:ph idx="1" type="body"/>
+          </p:nvPr>
+        </p:nvSpPr>
+        <p:spPr>
+          <a:xfrm>
+            <a:off x="4877475" y="3925529"/>
+            <a:ext cx="3981900" cy="1033800"/>
+          </a:xfrm>
+          <a:prstGeom prst="rect">
+            <a:avLst/>
+          </a:prstGeom>
+        </p:spPr>
+        <p:txBody>
+          <a:bodyPr anchorCtr="0" anchor="t" bIns="91425" lIns="91425" rIns="91425" tIns="91425">
+            <a:noAutofit/>
+          </a:bodyPr>
+          <a:lstStyle/>
+          <a:p>
+            <a:pPr indent="-317500" lvl="0" marL="457200" rtl="0">
+              <a:spcBef>
+                <a:spcPts val="0"/>
+              </a:spcBef>
+              <a:spcAft>
+                <a:spcPts val="0"/>
+              </a:spcAft>
+              <a:buSzPct val="100000"/>
+              <a:buChar char="●"/>
+            </a:pPr>
+            <a:r>
+              <a:rPr b="1" lang="en" sz="1400"/>
+              <a:t>Total </a:t>
+            </a:r>
+            <a:r>
+              <a:rPr b="1" lang="en" sz="1400"/>
+              <a:t>Participation</a:t>
+            </a:r>
+          </a:p>
+        </p:txBody>
+      </p:sp>
+      <p:pic>
+        <p:nvPicPr>
+          <p:cNvPr id="124" name="Shape 124"/>
+          <p:cNvPicPr preferRelativeResize="0"/>
+          <p:nvPr/>
+        </p:nvPicPr>
+        <p:blipFill rotWithShape="1">
+          <a:blip r:embed="rId3">
+            <a:alphaModFix/>
+          </a:blip>
+          <a:srcRect b="3919" l="-4950" r="4949" t="-3920"/>
+          <a:stretch/>
+        </p:blipFill>
+        <p:spPr>
+          <a:xfrm>
+            <a:off x="39375" y="27650"/>
+            <a:ext cx="4645050" cy="4931675"/>
+          </a:xfrm>
+          <a:prstGeom prst="rect">
+            <a:avLst/>
+          </a:prstGeom>
+          <a:noFill/>
+          <a:ln>
+            <a:noFill/>
+          </a:ln>
+        </p:spPr>
+      </p:pic>
     </p:spTree>
   </p:cSld>
   <p:clrMapOvr>
@@ -5464,8 +5937,8 @@
         </p:nvSpPr>
         <p:spPr>
           <a:xfrm>
-            <a:off x="1303725" y="802500"/>
-            <a:ext cx="6172500" cy="3538500"/>
+            <a:off x="99750" y="111000"/>
+            <a:ext cx="8944500" cy="4921500"/>
           </a:xfrm>
           <a:prstGeom prst="rect">
             <a:avLst/>
@@ -5484,6 +5957,79 @@
               <a:buNone/>
             </a:pPr>
             <a:r>
+              <a:rPr lang="en"/>
+              <a:t>ER Diagram</a:t>
+            </a:r>
+          </a:p>
+          <a:p>
+            <a:pPr lvl="0" rtl="0" algn="l">
+              <a:spcBef>
+                <a:spcPts val="0"/>
+              </a:spcBef>
+              <a:buNone/>
+            </a:pPr>
+            <a:r>
+              <a:t/>
+            </a:r>
+            <a:endParaRPr/>
+          </a:p>
+        </p:txBody>
+      </p:sp>
+    </p:spTree>
+  </p:cSld>
+  <p:clrMapOvr>
+    <a:masterClrMapping/>
+  </p:clrMapOvr>
+</p:sld>
+</file>
+
+<file path=ppt/slides/slide12.xml><?xml version="1.0" encoding="utf-8"?>
+<p:sld xmlns:a="http://schemas.openxmlformats.org/drawingml/2006/main" xmlns:r="http://schemas.openxmlformats.org/officeDocument/2006/relationships" xmlns:mc="http://schemas.openxmlformats.org/markup-compatibility/2006" xmlns:mv="urn:schemas-microsoft-com:mac:vml" xmlns:p="http://schemas.openxmlformats.org/presentationml/2006/main" xmlns:c="http://schemas.openxmlformats.org/drawingml/2006/chart" xmlns:dgm="http://schemas.openxmlformats.org/drawingml/2006/diagram" xmlns:o="urn:schemas-microsoft-com:office:office" xmlns:v="urn:schemas-microsoft-com:vml" xmlns:pvml="urn:schemas-microsoft-com:office:powerpoint" xmlns:com="http://schemas.openxmlformats.org/drawingml/2006/compatibility" xmlns:p14="http://schemas.microsoft.com/office/powerpoint/2010/main">
+  <p:cSld>
+    <p:spTree>
+      <p:nvGrpSpPr>
+        <p:cNvPr id="133" name="Shape 133"/>
+        <p:cNvGrpSpPr/>
+        <p:nvPr/>
+      </p:nvGrpSpPr>
+      <p:grpSpPr>
+        <a:xfrm>
+          <a:off x="0" y="0"/>
+          <a:ext cx="0" cy="0"/>
+          <a:chOff x="0" y="0"/>
+          <a:chExt cx="0" cy="0"/>
+        </a:xfrm>
+      </p:grpSpPr>
+      <p:sp>
+        <p:nvSpPr>
+          <p:cNvPr id="134" name="Shape 134"/>
+          <p:cNvSpPr txBox="1"/>
+          <p:nvPr>
+            <p:ph type="title"/>
+          </p:nvPr>
+        </p:nvSpPr>
+        <p:spPr>
+          <a:xfrm>
+            <a:off x="1303725" y="802500"/>
+            <a:ext cx="6172500" cy="3538500"/>
+          </a:xfrm>
+          <a:prstGeom prst="rect">
+            <a:avLst/>
+          </a:prstGeom>
+        </p:spPr>
+        <p:txBody>
+          <a:bodyPr anchorCtr="0" anchor="ctr" bIns="91425" lIns="91425" rIns="91425" tIns="91425">
+            <a:noAutofit/>
+          </a:bodyPr>
+          <a:lstStyle/>
+          <a:p>
+            <a:pPr lvl="0">
+              <a:spcBef>
+                <a:spcPts val="0"/>
+              </a:spcBef>
+              <a:buNone/>
+            </a:pPr>
+            <a:r>
               <a:t/>
             </a:r>
             <a:endParaRPr/>
@@ -5492,7 +6038,7 @@
       </p:sp>
       <p:pic>
         <p:nvPicPr>
-          <p:cNvPr id="130" name="Shape 130"/>
+          <p:cNvPr id="135" name="Shape 135"/>
           <p:cNvPicPr preferRelativeResize="0"/>
           <p:nvPr/>
         </p:nvPicPr>
@@ -5506,8 +6052,214 @@
         </p:blipFill>
         <p:spPr>
           <a:xfrm>
-            <a:off x="899400" y="86825"/>
-            <a:ext cx="7232750" cy="4969849"/>
+            <a:off x="1061812" y="151287"/>
+            <a:ext cx="6824374" cy="4840924"/>
+          </a:xfrm>
+          <a:prstGeom prst="rect">
+            <a:avLst/>
+          </a:prstGeom>
+          <a:noFill/>
+          <a:ln>
+            <a:noFill/>
+          </a:ln>
+        </p:spPr>
+      </p:pic>
+    </p:spTree>
+  </p:cSld>
+  <p:clrMapOvr>
+    <a:masterClrMapping/>
+  </p:clrMapOvr>
+</p:sld>
+</file>
+
+<file path=ppt/slides/slide13.xml><?xml version="1.0" encoding="utf-8"?>
+<p:sld xmlns:a="http://schemas.openxmlformats.org/drawingml/2006/main" xmlns:r="http://schemas.openxmlformats.org/officeDocument/2006/relationships" xmlns:mc="http://schemas.openxmlformats.org/markup-compatibility/2006" xmlns:mv="urn:schemas-microsoft-com:mac:vml" xmlns:p="http://schemas.openxmlformats.org/presentationml/2006/main" xmlns:c="http://schemas.openxmlformats.org/drawingml/2006/chart" xmlns:dgm="http://schemas.openxmlformats.org/drawingml/2006/diagram" xmlns:o="urn:schemas-microsoft-com:office:office" xmlns:v="urn:schemas-microsoft-com:vml" xmlns:pvml="urn:schemas-microsoft-com:office:powerpoint" xmlns:com="http://schemas.openxmlformats.org/drawingml/2006/compatibility" xmlns:p14="http://schemas.microsoft.com/office/powerpoint/2010/main">
+  <p:cSld>
+    <p:spTree>
+      <p:nvGrpSpPr>
+        <p:cNvPr id="139" name="Shape 139"/>
+        <p:cNvGrpSpPr/>
+        <p:nvPr/>
+      </p:nvGrpSpPr>
+      <p:grpSpPr>
+        <a:xfrm>
+          <a:off x="0" y="0"/>
+          <a:ext cx="0" cy="0"/>
+          <a:chOff x="0" y="0"/>
+          <a:chExt cx="0" cy="0"/>
+        </a:xfrm>
+      </p:grpSpPr>
+      <p:sp>
+        <p:nvSpPr>
+          <p:cNvPr id="140" name="Shape 140"/>
+          <p:cNvSpPr txBox="1"/>
+          <p:nvPr>
+            <p:ph type="title"/>
+          </p:nvPr>
+        </p:nvSpPr>
+        <p:spPr>
+          <a:xfrm>
+            <a:off x="1303725" y="802500"/>
+            <a:ext cx="6172500" cy="3538500"/>
+          </a:xfrm>
+          <a:prstGeom prst="rect">
+            <a:avLst/>
+          </a:prstGeom>
+        </p:spPr>
+        <p:txBody>
+          <a:bodyPr anchorCtr="0" anchor="ctr" bIns="91425" lIns="91425" rIns="91425" tIns="91425">
+            <a:noAutofit/>
+          </a:bodyPr>
+          <a:lstStyle/>
+          <a:p>
+            <a:pPr lvl="0" rtl="0">
+              <a:spcBef>
+                <a:spcPts val="0"/>
+              </a:spcBef>
+              <a:buNone/>
+            </a:pPr>
+            <a:r>
+              <a:t/>
+            </a:r>
+            <a:endParaRPr/>
+          </a:p>
+        </p:txBody>
+      </p:sp>
+      <p:pic>
+        <p:nvPicPr>
+          <p:cNvPr id="141" name="Shape 141"/>
+          <p:cNvPicPr preferRelativeResize="0"/>
+          <p:nvPr/>
+        </p:nvPicPr>
+        <p:blipFill>
+          <a:blip r:embed="rId3">
+            <a:alphaModFix/>
+          </a:blip>
+          <a:stretch>
+            <a:fillRect/>
+          </a:stretch>
+        </p:blipFill>
+        <p:spPr>
+          <a:xfrm>
+            <a:off x="135850" y="761000"/>
+            <a:ext cx="8872301" cy="3621499"/>
+          </a:xfrm>
+          <a:prstGeom prst="rect">
+            <a:avLst/>
+          </a:prstGeom>
+          <a:noFill/>
+          <a:ln>
+            <a:noFill/>
+          </a:ln>
+        </p:spPr>
+      </p:pic>
+      <p:pic>
+        <p:nvPicPr>
+          <p:cNvPr id="142" name="Shape 142"/>
+          <p:cNvPicPr preferRelativeResize="0"/>
+          <p:nvPr/>
+        </p:nvPicPr>
+        <p:blipFill>
+          <a:blip r:embed="rId4">
+            <a:alphaModFix/>
+          </a:blip>
+          <a:stretch>
+            <a:fillRect/>
+          </a:stretch>
+        </p:blipFill>
+        <p:spPr>
+          <a:xfrm>
+            <a:off x="0" y="693901"/>
+            <a:ext cx="9144001" cy="3755697"/>
+          </a:xfrm>
+          <a:prstGeom prst="rect">
+            <a:avLst/>
+          </a:prstGeom>
+          <a:noFill/>
+          <a:ln>
+            <a:noFill/>
+          </a:ln>
+        </p:spPr>
+      </p:pic>
+    </p:spTree>
+  </p:cSld>
+  <p:clrMapOvr>
+    <a:masterClrMapping/>
+  </p:clrMapOvr>
+</p:sld>
+</file>
+
+<file path=ppt/slides/slide14.xml><?xml version="1.0" encoding="utf-8"?>
+<p:sld xmlns:a="http://schemas.openxmlformats.org/drawingml/2006/main" xmlns:r="http://schemas.openxmlformats.org/officeDocument/2006/relationships" xmlns:mc="http://schemas.openxmlformats.org/markup-compatibility/2006" xmlns:mv="urn:schemas-microsoft-com:mac:vml" xmlns:p="http://schemas.openxmlformats.org/presentationml/2006/main" xmlns:c="http://schemas.openxmlformats.org/drawingml/2006/chart" xmlns:dgm="http://schemas.openxmlformats.org/drawingml/2006/diagram" xmlns:o="urn:schemas-microsoft-com:office:office" xmlns:v="urn:schemas-microsoft-com:vml" xmlns:pvml="urn:schemas-microsoft-com:office:powerpoint" xmlns:com="http://schemas.openxmlformats.org/drawingml/2006/compatibility" xmlns:p14="http://schemas.microsoft.com/office/powerpoint/2010/main">
+  <p:cSld>
+    <p:spTree>
+      <p:nvGrpSpPr>
+        <p:cNvPr id="146" name="Shape 146"/>
+        <p:cNvGrpSpPr/>
+        <p:nvPr/>
+      </p:nvGrpSpPr>
+      <p:grpSpPr>
+        <a:xfrm>
+          <a:off x="0" y="0"/>
+          <a:ext cx="0" cy="0"/>
+          <a:chOff x="0" y="0"/>
+          <a:chExt cx="0" cy="0"/>
+        </a:xfrm>
+      </p:grpSpPr>
+      <p:sp>
+        <p:nvSpPr>
+          <p:cNvPr id="147" name="Shape 147"/>
+          <p:cNvSpPr txBox="1"/>
+          <p:nvPr>
+            <p:ph type="title"/>
+          </p:nvPr>
+        </p:nvSpPr>
+        <p:spPr>
+          <a:xfrm>
+            <a:off x="1303725" y="802500"/>
+            <a:ext cx="6172500" cy="3538500"/>
+          </a:xfrm>
+          <a:prstGeom prst="rect">
+            <a:avLst/>
+          </a:prstGeom>
+        </p:spPr>
+        <p:txBody>
+          <a:bodyPr anchorCtr="0" anchor="ctr" bIns="91425" lIns="91425" rIns="91425" tIns="91425">
+            <a:noAutofit/>
+          </a:bodyPr>
+          <a:lstStyle/>
+          <a:p>
+            <a:pPr lvl="0" rtl="0">
+              <a:spcBef>
+                <a:spcPts val="0"/>
+              </a:spcBef>
+              <a:buNone/>
+            </a:pPr>
+            <a:r>
+              <a:t/>
+            </a:r>
+            <a:endParaRPr/>
+          </a:p>
+        </p:txBody>
+      </p:sp>
+      <p:pic>
+        <p:nvPicPr>
+          <p:cNvPr id="148" name="Shape 148"/>
+          <p:cNvPicPr preferRelativeResize="0"/>
+          <p:nvPr/>
+        </p:nvPicPr>
+        <p:blipFill>
+          <a:blip r:embed="rId3">
+            <a:alphaModFix/>
+          </a:blip>
+          <a:stretch>
+            <a:fillRect/>
+          </a:stretch>
+        </p:blipFill>
+        <p:spPr>
+          <a:xfrm>
+            <a:off x="218525" y="120575"/>
+            <a:ext cx="8723774" cy="4902350"/>
           </a:xfrm>
           <a:prstGeom prst="rect">
             <a:avLst/>
@@ -5589,8 +6341,8 @@
         </p:nvSpPr>
         <p:spPr>
           <a:xfrm>
-            <a:off x="311700" y="1228675"/>
-            <a:ext cx="8520599" cy="3340199"/>
+            <a:off x="311700" y="976550"/>
+            <a:ext cx="8520600" cy="3830700"/>
           </a:xfrm>
           <a:prstGeom prst="rect">
             <a:avLst/>
@@ -5609,9 +6361,25 @@
               <a:buNone/>
             </a:pPr>
             <a:r>
+              <a:rPr lang="en" sz="1400"/>
+              <a:t>We aim to develop a flexible Human Resource Management System specifically for medium-sized Grocery store corporations. This system will utilize SQL for database inquiries. Using the Browser the HR department would log into the system. From there they would be able to search for employees using their worker ID key from the table. Once the worker is pulled up using the system, the worker’s full information will also be displayed for the HR department. </a:t>
+            </a:r>
+          </a:p>
+          <a:p>
+            <a:pPr lvl="0">
+              <a:spcBef>
+                <a:spcPts val="0"/>
+              </a:spcBef>
+              <a:buNone/>
+            </a:pPr>
+            <a:r>
               <a:t/>
             </a:r>
-            <a:endParaRPr/>
+            <a:endParaRPr>
+              <a:highlight>
+                <a:srgbClr val="F1C232"/>
+              </a:highlight>
+            </a:endParaRPr>
           </a:p>
           <a:p>
             <a:pPr lvl="0">
@@ -5621,8 +6389,12 @@
               <a:buNone/>
             </a:pPr>
             <a:r>
+              <a:rPr lang="en" sz="1400"/>
+              <a:t>Using these specifications, a company would be able to create departments as tables, and would allow employees to be placed into departments. A considerable business restraint would be that the system will have to be accessed via a web browser interface.</a:t>
+            </a:r>
+            <a:r>
               <a:rPr lang="en"/>
-              <a:t>We aim to develop a flexible Human Resource Management System specifically for medium-sized Grocery store corporations. This system will utilize SQL for database inquiries. From this a company would be able to create departments as tables, and would allow employees to be placed into departments. A considerable business restraint would be that the system will have to be accessed via a web browser interface. </a:t>
+              <a:t> </a:t>
             </a:r>
           </a:p>
         </p:txBody>
@@ -5662,126 +6434,391 @@
         </p:nvSpPr>
         <p:spPr>
           <a:xfrm>
-            <a:off x="311700" y="292850"/>
-            <a:ext cx="8520600" cy="801000"/>
+            <a:off x="988349" y="802500"/>
+            <a:ext cx="7167300" cy="3538500"/>
           </a:xfrm>
           <a:prstGeom prst="rect">
             <a:avLst/>
           </a:prstGeom>
         </p:spPr>
         <p:txBody>
-          <a:bodyPr anchorCtr="0" anchor="t" bIns="91425" lIns="91425" rIns="91425" tIns="91425">
+          <a:bodyPr anchorCtr="0" anchor="ctr" bIns="91425" lIns="91425" rIns="91425" tIns="91425">
             <a:noAutofit/>
           </a:bodyPr>
           <a:lstStyle/>
           <a:p>
-            <a:pPr lvl="0" rtl="0">
-              <a:spcBef>
-                <a:spcPts val="0"/>
-              </a:spcBef>
-              <a:buNone/>
-            </a:pPr>
-            <a:r>
-              <a:rPr lang="en"/>
-              <a:t>Roles</a:t>
-            </a:r>
-          </a:p>
-        </p:txBody>
-      </p:sp>
-      <p:sp>
-        <p:nvSpPr>
-          <p:cNvPr id="69" name="Shape 69"/>
-          <p:cNvSpPr txBox="1"/>
-          <p:nvPr>
-            <p:ph idx="1" type="body"/>
-          </p:nvPr>
-        </p:nvSpPr>
-        <p:spPr>
-          <a:xfrm>
-            <a:off x="311700" y="1228675"/>
-            <a:ext cx="8520600" cy="3340200"/>
-          </a:xfrm>
-          <a:prstGeom prst="rect">
-            <a:avLst/>
-          </a:prstGeom>
-        </p:spPr>
-        <p:txBody>
-          <a:bodyPr anchorCtr="0" anchor="t" bIns="91425" lIns="91425" rIns="91425" tIns="91425">
-            <a:noAutofit/>
-          </a:bodyPr>
-          <a:lstStyle/>
-          <a:p>
-            <a:pPr lvl="0" rtl="0">
-              <a:spcBef>
-                <a:spcPts val="0"/>
-              </a:spcBef>
-              <a:buNone/>
-            </a:pPr>
-            <a:r>
-              <a:t/>
-            </a:r>
-            <a:endParaRPr/>
-          </a:p>
-          <a:p>
-            <a:pPr indent="-228600" lvl="0" marL="457200" rtl="0">
-              <a:spcBef>
-                <a:spcPts val="0"/>
-              </a:spcBef>
-            </a:pPr>
-            <a:r>
-              <a:rPr lang="en"/>
-              <a:t>Ortagus Winfrey- Analyst</a:t>
-            </a:r>
-          </a:p>
-          <a:p>
-            <a:pPr indent="-228600" lvl="0" marL="457200" rtl="0">
-              <a:spcBef>
-                <a:spcPts val="0"/>
-              </a:spcBef>
-            </a:pPr>
-            <a:r>
-              <a:rPr lang="en"/>
-              <a:t>Ryan Ocampo- Architecture/back-end</a:t>
-            </a:r>
-          </a:p>
-          <a:p>
-            <a:pPr indent="-228600" lvl="0" marL="457200" rtl="0">
-              <a:spcBef>
-                <a:spcPts val="0"/>
-              </a:spcBef>
-            </a:pPr>
-            <a:r>
-              <a:rPr lang="en"/>
-              <a:t>Mechal Terfie- Backend/testing</a:t>
-            </a:r>
-          </a:p>
-          <a:p>
-            <a:pPr indent="-228600" lvl="0" marL="457200" rtl="0">
-              <a:spcBef>
-                <a:spcPts val="0"/>
-              </a:spcBef>
-            </a:pPr>
-            <a:r>
-              <a:rPr lang="en"/>
-              <a:t>Shenila Daredia- Frontend/back-end</a:t>
-            </a:r>
-          </a:p>
-          <a:p>
-            <a:pPr indent="-228600" lvl="0" marL="457200" rtl="0">
-              <a:spcBef>
-                <a:spcPts val="0"/>
-              </a:spcBef>
-            </a:pPr>
-            <a:r>
-              <a:rPr lang="en"/>
-              <a:t>Dalya Khatun- Frontend/back-end/testing </a:t>
-            </a:r>
-            <a:br>
-              <a:rPr lang="en"/>
-            </a:br>
-            <a:br>
-              <a:rPr lang="en"/>
-            </a:br>
+            <a:pPr lvl="0" rtl="0" algn="l">
+              <a:lnSpc>
+                <a:spcPct val="115000"/>
+              </a:lnSpc>
+              <a:spcBef>
+                <a:spcPts val="0"/>
+              </a:spcBef>
+              <a:spcAft>
+                <a:spcPts val="1600"/>
+              </a:spcAft>
+              <a:buNone/>
+            </a:pPr>
+            <a:r>
+              <a:rPr lang="en" sz="1800">
+                <a:solidFill>
+                  <a:schemeClr val="dk2"/>
+                </a:solidFill>
+                <a:highlight>
+                  <a:srgbClr val="F1C232"/>
+                </a:highlight>
+                <a:latin typeface="Source Code Pro"/>
+                <a:ea typeface="Source Code Pro"/>
+                <a:cs typeface="Source Code Pro"/>
+                <a:sym typeface="Source Code Pro"/>
+              </a:rPr>
+              <a:t>“Employees</a:t>
+            </a:r>
+            <a:r>
+              <a:rPr b="0" lang="en" sz="1800">
+                <a:solidFill>
+                  <a:schemeClr val="dk2"/>
+                </a:solidFill>
+                <a:highlight>
+                  <a:srgbClr val="F1C232"/>
+                </a:highlight>
+                <a:latin typeface="Source Code Pro"/>
+                <a:ea typeface="Source Code Pro"/>
+                <a:cs typeface="Source Code Pro"/>
+                <a:sym typeface="Source Code Pro"/>
+              </a:rPr>
+              <a:t> can </a:t>
+            </a:r>
+            <a:r>
+              <a:rPr b="0" i="1" lang="en" sz="1800" u="sng">
+                <a:solidFill>
+                  <a:schemeClr val="dk2"/>
+                </a:solidFill>
+                <a:highlight>
+                  <a:srgbClr val="F1C232"/>
+                </a:highlight>
+                <a:latin typeface="Source Code Pro"/>
+                <a:ea typeface="Source Code Pro"/>
+                <a:cs typeface="Source Code Pro"/>
+                <a:sym typeface="Source Code Pro"/>
+              </a:rPr>
+              <a:t>supervise</a:t>
+            </a:r>
+            <a:r>
+              <a:rPr b="0" lang="en" sz="1800">
+                <a:solidFill>
+                  <a:schemeClr val="dk2"/>
+                </a:solidFill>
+                <a:highlight>
+                  <a:srgbClr val="F1C232"/>
+                </a:highlight>
+                <a:latin typeface="Source Code Pro"/>
+                <a:ea typeface="Source Code Pro"/>
+                <a:cs typeface="Source Code Pro"/>
+                <a:sym typeface="Source Code Pro"/>
+              </a:rPr>
+              <a:t> other </a:t>
+            </a:r>
+            <a:r>
+              <a:rPr lang="en" sz="1800">
+                <a:solidFill>
+                  <a:schemeClr val="dk2"/>
+                </a:solidFill>
+                <a:highlight>
+                  <a:srgbClr val="F1C232"/>
+                </a:highlight>
+                <a:latin typeface="Source Code Pro"/>
+                <a:ea typeface="Source Code Pro"/>
+                <a:cs typeface="Source Code Pro"/>
+                <a:sym typeface="Source Code Pro"/>
+              </a:rPr>
+              <a:t>Employees</a:t>
+            </a:r>
+            <a:r>
+              <a:rPr b="0" lang="en" sz="1800">
+                <a:solidFill>
+                  <a:schemeClr val="dk2"/>
+                </a:solidFill>
+                <a:highlight>
+                  <a:srgbClr val="F1C232"/>
+                </a:highlight>
+                <a:latin typeface="Source Code Pro"/>
+                <a:ea typeface="Source Code Pro"/>
+                <a:cs typeface="Source Code Pro"/>
+                <a:sym typeface="Source Code Pro"/>
+              </a:rPr>
+              <a:t>, </a:t>
+            </a:r>
+            <a:r>
+              <a:rPr lang="en" sz="1800">
+                <a:solidFill>
+                  <a:schemeClr val="dk2"/>
+                </a:solidFill>
+                <a:highlight>
+                  <a:srgbClr val="F1C232"/>
+                </a:highlight>
+                <a:latin typeface="Source Code Pro"/>
+                <a:ea typeface="Source Code Pro"/>
+                <a:cs typeface="Source Code Pro"/>
+                <a:sym typeface="Source Code Pro"/>
+              </a:rPr>
+              <a:t>Employees</a:t>
+            </a:r>
+            <a:r>
+              <a:rPr b="0" lang="en" sz="1800">
+                <a:solidFill>
+                  <a:schemeClr val="dk2"/>
+                </a:solidFill>
+                <a:highlight>
+                  <a:srgbClr val="F1C232"/>
+                </a:highlight>
+                <a:latin typeface="Source Code Pro"/>
+                <a:ea typeface="Source Code Pro"/>
+                <a:cs typeface="Source Code Pro"/>
+                <a:sym typeface="Source Code Pro"/>
+              </a:rPr>
+              <a:t> </a:t>
+            </a:r>
+            <a:r>
+              <a:rPr b="0" i="1" lang="en" sz="1800" u="sng">
+                <a:solidFill>
+                  <a:schemeClr val="dk2"/>
+                </a:solidFill>
+                <a:highlight>
+                  <a:srgbClr val="F1C232"/>
+                </a:highlight>
+                <a:latin typeface="Source Code Pro"/>
+                <a:ea typeface="Source Code Pro"/>
+                <a:cs typeface="Source Code Pro"/>
+                <a:sym typeface="Source Code Pro"/>
+              </a:rPr>
+              <a:t>work for</a:t>
+            </a:r>
+            <a:r>
+              <a:rPr b="0" lang="en" sz="1800">
+                <a:solidFill>
+                  <a:schemeClr val="dk2"/>
+                </a:solidFill>
+                <a:highlight>
+                  <a:srgbClr val="F1C232"/>
+                </a:highlight>
+                <a:latin typeface="Source Code Pro"/>
+                <a:ea typeface="Source Code Pro"/>
+                <a:cs typeface="Source Code Pro"/>
+                <a:sym typeface="Source Code Pro"/>
+              </a:rPr>
+              <a:t> </a:t>
+            </a:r>
+            <a:r>
+              <a:rPr lang="en" sz="1800">
+                <a:solidFill>
+                  <a:schemeClr val="dk2"/>
+                </a:solidFill>
+                <a:highlight>
+                  <a:srgbClr val="F1C232"/>
+                </a:highlight>
+                <a:latin typeface="Source Code Pro"/>
+                <a:ea typeface="Source Code Pro"/>
+                <a:cs typeface="Source Code Pro"/>
+                <a:sym typeface="Source Code Pro"/>
+              </a:rPr>
+              <a:t>Positions</a:t>
+            </a:r>
+            <a:r>
+              <a:rPr b="0" lang="en" sz="1800">
+                <a:solidFill>
+                  <a:schemeClr val="dk2"/>
+                </a:solidFill>
+                <a:highlight>
+                  <a:srgbClr val="F1C232"/>
+                </a:highlight>
+                <a:latin typeface="Source Code Pro"/>
+                <a:ea typeface="Source Code Pro"/>
+                <a:cs typeface="Source Code Pro"/>
+                <a:sym typeface="Source Code Pro"/>
+              </a:rPr>
+              <a:t>, </a:t>
+            </a:r>
+            <a:r>
+              <a:rPr lang="en" sz="1800">
+                <a:solidFill>
+                  <a:schemeClr val="dk2"/>
+                </a:solidFill>
+                <a:highlight>
+                  <a:srgbClr val="F1C232"/>
+                </a:highlight>
+                <a:latin typeface="Source Code Pro"/>
+                <a:ea typeface="Source Code Pro"/>
+                <a:cs typeface="Source Code Pro"/>
+                <a:sym typeface="Source Code Pro"/>
+              </a:rPr>
+              <a:t>Positions</a:t>
+            </a:r>
+            <a:r>
+              <a:rPr b="0" lang="en" sz="1800">
+                <a:solidFill>
+                  <a:schemeClr val="dk2"/>
+                </a:solidFill>
+                <a:highlight>
+                  <a:srgbClr val="F1C232"/>
+                </a:highlight>
+                <a:latin typeface="Source Code Pro"/>
+                <a:ea typeface="Source Code Pro"/>
+                <a:cs typeface="Source Code Pro"/>
+                <a:sym typeface="Source Code Pro"/>
+              </a:rPr>
+              <a:t> are </a:t>
+            </a:r>
+            <a:r>
+              <a:rPr b="0" i="1" lang="en" sz="1800" u="sng">
+                <a:solidFill>
+                  <a:schemeClr val="dk2"/>
+                </a:solidFill>
+                <a:highlight>
+                  <a:srgbClr val="F1C232"/>
+                </a:highlight>
+                <a:latin typeface="Source Code Pro"/>
+                <a:ea typeface="Source Code Pro"/>
+                <a:cs typeface="Source Code Pro"/>
+                <a:sym typeface="Source Code Pro"/>
+              </a:rPr>
+              <a:t>found under</a:t>
+            </a:r>
+            <a:r>
+              <a:rPr b="0" lang="en" sz="1800">
+                <a:solidFill>
+                  <a:schemeClr val="dk2"/>
+                </a:solidFill>
+                <a:highlight>
+                  <a:srgbClr val="F1C232"/>
+                </a:highlight>
+                <a:latin typeface="Source Code Pro"/>
+                <a:ea typeface="Source Code Pro"/>
+                <a:cs typeface="Source Code Pro"/>
+                <a:sym typeface="Source Code Pro"/>
+              </a:rPr>
+              <a:t> </a:t>
+            </a:r>
+            <a:r>
+              <a:rPr lang="en" sz="1800">
+                <a:solidFill>
+                  <a:schemeClr val="dk2"/>
+                </a:solidFill>
+                <a:highlight>
+                  <a:srgbClr val="F1C232"/>
+                </a:highlight>
+                <a:latin typeface="Source Code Pro"/>
+                <a:ea typeface="Source Code Pro"/>
+                <a:cs typeface="Source Code Pro"/>
+                <a:sym typeface="Source Code Pro"/>
+              </a:rPr>
+              <a:t>Departments</a:t>
+            </a:r>
+            <a:r>
+              <a:rPr b="0" lang="en" sz="1800">
+                <a:solidFill>
+                  <a:schemeClr val="dk2"/>
+                </a:solidFill>
+                <a:highlight>
+                  <a:srgbClr val="F1C232"/>
+                </a:highlight>
+                <a:latin typeface="Source Code Pro"/>
+                <a:ea typeface="Source Code Pro"/>
+                <a:cs typeface="Source Code Pro"/>
+                <a:sym typeface="Source Code Pro"/>
+              </a:rPr>
+              <a:t>, and </a:t>
+            </a:r>
+            <a:r>
+              <a:rPr lang="en" sz="1800">
+                <a:solidFill>
+                  <a:schemeClr val="dk2"/>
+                </a:solidFill>
+                <a:highlight>
+                  <a:srgbClr val="F1C232"/>
+                </a:highlight>
+                <a:latin typeface="Source Code Pro"/>
+                <a:ea typeface="Source Code Pro"/>
+                <a:cs typeface="Source Code Pro"/>
+                <a:sym typeface="Source Code Pro"/>
+              </a:rPr>
+              <a:t>Departments</a:t>
+            </a:r>
+            <a:r>
+              <a:rPr b="0" lang="en" sz="1800">
+                <a:solidFill>
+                  <a:schemeClr val="dk2"/>
+                </a:solidFill>
+                <a:highlight>
+                  <a:srgbClr val="F1C232"/>
+                </a:highlight>
+                <a:latin typeface="Source Code Pro"/>
+                <a:ea typeface="Source Code Pro"/>
+                <a:cs typeface="Source Code Pro"/>
+                <a:sym typeface="Source Code Pro"/>
+              </a:rPr>
+              <a:t> are </a:t>
+            </a:r>
+            <a:r>
+              <a:rPr b="0" i="1" lang="en" sz="1800" u="sng">
+                <a:solidFill>
+                  <a:schemeClr val="dk2"/>
+                </a:solidFill>
+                <a:highlight>
+                  <a:srgbClr val="F1C232"/>
+                </a:highlight>
+                <a:latin typeface="Source Code Pro"/>
+                <a:ea typeface="Source Code Pro"/>
+                <a:cs typeface="Source Code Pro"/>
+                <a:sym typeface="Source Code Pro"/>
+              </a:rPr>
+              <a:t>located within</a:t>
+            </a:r>
+            <a:r>
+              <a:rPr b="0" lang="en" sz="1800">
+                <a:solidFill>
+                  <a:schemeClr val="dk2"/>
+                </a:solidFill>
+                <a:highlight>
+                  <a:srgbClr val="F1C232"/>
+                </a:highlight>
+                <a:latin typeface="Source Code Pro"/>
+                <a:ea typeface="Source Code Pro"/>
+                <a:cs typeface="Source Code Pro"/>
+                <a:sym typeface="Source Code Pro"/>
+              </a:rPr>
+              <a:t> </a:t>
+            </a:r>
+            <a:r>
+              <a:rPr lang="en" sz="1800">
+                <a:solidFill>
+                  <a:schemeClr val="dk2"/>
+                </a:solidFill>
+                <a:highlight>
+                  <a:srgbClr val="F1C232"/>
+                </a:highlight>
+                <a:latin typeface="Source Code Pro"/>
+                <a:ea typeface="Source Code Pro"/>
+                <a:cs typeface="Source Code Pro"/>
+                <a:sym typeface="Source Code Pro"/>
+              </a:rPr>
+              <a:t>Stores</a:t>
+            </a:r>
+            <a:r>
+              <a:rPr b="0" lang="en" sz="1800">
+                <a:solidFill>
+                  <a:schemeClr val="dk2"/>
+                </a:solidFill>
+                <a:highlight>
+                  <a:srgbClr val="F1C232"/>
+                </a:highlight>
+                <a:latin typeface="Source Code Pro"/>
+                <a:ea typeface="Source Code Pro"/>
+                <a:cs typeface="Source Code Pro"/>
+                <a:sym typeface="Source Code Pro"/>
+              </a:rPr>
+              <a:t>.”</a:t>
+            </a:r>
           </a:p>
         </p:txBody>
       </p:sp>
@@ -5798,7 +6835,7 @@
   <p:cSld>
     <p:spTree>
       <p:nvGrpSpPr>
-        <p:cNvPr id="73" name="Shape 73"/>
+        <p:cNvPr id="72" name="Shape 72"/>
         <p:cNvGrpSpPr/>
         <p:nvPr/>
       </p:nvGrpSpPr>
@@ -5812,7 +6849,7 @@
       </p:grpSpPr>
       <p:sp>
         <p:nvSpPr>
-          <p:cNvPr id="74" name="Shape 74"/>
+          <p:cNvPr id="73" name="Shape 73"/>
           <p:cNvSpPr txBox="1"/>
           <p:nvPr>
             <p:ph type="title"/>
@@ -5820,20 +6857,20 @@
         </p:nvSpPr>
         <p:spPr>
           <a:xfrm>
-            <a:off x="2802750" y="802500"/>
-            <a:ext cx="3538499" cy="3538499"/>
+            <a:off x="311700" y="292850"/>
+            <a:ext cx="8520600" cy="801000"/>
           </a:xfrm>
           <a:prstGeom prst="rect">
             <a:avLst/>
           </a:prstGeom>
         </p:spPr>
         <p:txBody>
-          <a:bodyPr anchorCtr="0" anchor="ctr" bIns="91425" lIns="91425" rIns="91425" tIns="91425">
+          <a:bodyPr anchorCtr="0" anchor="t" bIns="91425" lIns="91425" rIns="91425" tIns="91425">
             <a:noAutofit/>
           </a:bodyPr>
           <a:lstStyle/>
           <a:p>
-            <a:pPr lvl="0">
+            <a:pPr lvl="0" rtl="0">
               <a:spcBef>
                 <a:spcPts val="0"/>
               </a:spcBef>
@@ -5841,8 +6878,105 @@
             </a:pPr>
             <a:r>
               <a:rPr lang="en"/>
-              <a:t>Entities</a:t>
-            </a:r>
+              <a:t>Roles</a:t>
+            </a:r>
+          </a:p>
+        </p:txBody>
+      </p:sp>
+      <p:sp>
+        <p:nvSpPr>
+          <p:cNvPr id="74" name="Shape 74"/>
+          <p:cNvSpPr txBox="1"/>
+          <p:nvPr>
+            <p:ph idx="1" type="body"/>
+          </p:nvPr>
+        </p:nvSpPr>
+        <p:spPr>
+          <a:xfrm>
+            <a:off x="311700" y="1228675"/>
+            <a:ext cx="8520600" cy="3340200"/>
+          </a:xfrm>
+          <a:prstGeom prst="rect">
+            <a:avLst/>
+          </a:prstGeom>
+        </p:spPr>
+        <p:txBody>
+          <a:bodyPr anchorCtr="0" anchor="t" bIns="91425" lIns="91425" rIns="91425" tIns="91425">
+            <a:noAutofit/>
+          </a:bodyPr>
+          <a:lstStyle/>
+          <a:p>
+            <a:pPr lvl="0" rtl="0">
+              <a:spcBef>
+                <a:spcPts val="0"/>
+              </a:spcBef>
+              <a:buNone/>
+            </a:pPr>
+            <a:r>
+              <a:t/>
+            </a:r>
+            <a:endParaRPr/>
+          </a:p>
+          <a:p>
+            <a:pPr indent="-228600" lvl="0" marL="457200" rtl="0">
+              <a:spcBef>
+                <a:spcPts val="0"/>
+              </a:spcBef>
+            </a:pPr>
+            <a:r>
+              <a:rPr lang="en"/>
+              <a:t>Ortagus Winfrey- Analyst</a:t>
+            </a:r>
+          </a:p>
+          <a:p>
+            <a:pPr indent="-228600" lvl="0" marL="457200" rtl="0">
+              <a:spcBef>
+                <a:spcPts val="0"/>
+              </a:spcBef>
+            </a:pPr>
+            <a:r>
+              <a:rPr lang="en"/>
+              <a:t>Ryan Ocampo- Architecture/back-end</a:t>
+            </a:r>
+          </a:p>
+          <a:p>
+            <a:pPr indent="-228600" lvl="0" marL="457200" rtl="0">
+              <a:spcBef>
+                <a:spcPts val="0"/>
+              </a:spcBef>
+            </a:pPr>
+            <a:r>
+              <a:rPr lang="en"/>
+              <a:t>Mechal Terfie- Backend/testing</a:t>
+            </a:r>
+          </a:p>
+          <a:p>
+            <a:pPr indent="-228600" lvl="0" marL="457200" rtl="0">
+              <a:spcBef>
+                <a:spcPts val="0"/>
+              </a:spcBef>
+            </a:pPr>
+            <a:r>
+              <a:rPr lang="en"/>
+              <a:t>Shenila Daredia- Frontend/back-end/client</a:t>
+            </a:r>
+          </a:p>
+          <a:p>
+            <a:pPr indent="-228600" lvl="0" marL="457200" rtl="0">
+              <a:spcBef>
+                <a:spcPts val="0"/>
+              </a:spcBef>
+            </a:pPr>
+            <a:r>
+              <a:rPr lang="en"/>
+              <a:t>Dalya Khatun- Frontend/back-end/testing </a:t>
+            </a:r>
+            <a:br>
+              <a:rPr lang="en"/>
+            </a:br>
+            <a:br>
+              <a:rPr lang="en"/>
+            </a:br>
           </a:p>
         </p:txBody>
       </p:sp>
@@ -5881,208 +7015,32 @@
         </p:nvSpPr>
         <p:spPr>
           <a:xfrm>
-            <a:off x="4877475" y="296900"/>
-            <a:ext cx="3981899" cy="629100"/>
+            <a:off x="2802750" y="802500"/>
+            <a:ext cx="3538500" cy="3538500"/>
           </a:xfrm>
           <a:prstGeom prst="rect">
             <a:avLst/>
           </a:prstGeom>
         </p:spPr>
         <p:txBody>
-          <a:bodyPr anchorCtr="0" anchor="t" bIns="91425" lIns="91425" rIns="91425" tIns="91425">
+          <a:bodyPr anchorCtr="0" anchor="ctr" bIns="91425" lIns="91425" rIns="91425" tIns="91425">
             <a:noAutofit/>
           </a:bodyPr>
           <a:lstStyle/>
           <a:p>
-            <a:pPr lvl="0">
-              <a:spcBef>
-                <a:spcPts val="0"/>
-              </a:spcBef>
-              <a:buNone/>
-            </a:pPr>
-            <a:r>
-              <a:rPr lang="en" sz="3600"/>
-              <a:t>&lt;Employee&gt; </a:t>
+            <a:pPr lvl="0" rtl="0">
+              <a:spcBef>
+                <a:spcPts val="0"/>
+              </a:spcBef>
+              <a:buNone/>
+            </a:pPr>
+            <a:r>
+              <a:rPr lang="en"/>
+              <a:t>Entities</a:t>
             </a:r>
           </a:p>
         </p:txBody>
       </p:sp>
-      <p:sp>
-        <p:nvSpPr>
-          <p:cNvPr id="80" name="Shape 80"/>
-          <p:cNvSpPr txBox="1"/>
-          <p:nvPr>
-            <p:ph idx="1" type="body"/>
-          </p:nvPr>
-        </p:nvSpPr>
-        <p:spPr>
-          <a:xfrm>
-            <a:off x="4877475" y="1275625"/>
-            <a:ext cx="3981899" cy="1033799"/>
-          </a:xfrm>
-          <a:prstGeom prst="rect">
-            <a:avLst/>
-          </a:prstGeom>
-        </p:spPr>
-        <p:txBody>
-          <a:bodyPr anchorCtr="0" anchor="t" bIns="91425" lIns="91425" rIns="91425" tIns="91425">
-            <a:noAutofit/>
-          </a:bodyPr>
-          <a:lstStyle/>
-          <a:p>
-            <a:pPr lvl="0">
-              <a:spcBef>
-                <a:spcPts val="0"/>
-              </a:spcBef>
-              <a:spcAft>
-                <a:spcPts val="0"/>
-              </a:spcAft>
-              <a:buNone/>
-            </a:pPr>
-            <a:r>
-              <a:rPr b="1" lang="en" sz="1600"/>
-              <a:t>Workers that make up the company</a:t>
-            </a:r>
-          </a:p>
-          <a:p>
-            <a:pPr lvl="0">
-              <a:spcBef>
-                <a:spcPts val="0"/>
-              </a:spcBef>
-              <a:spcAft>
-                <a:spcPts val="0"/>
-              </a:spcAft>
-              <a:buNone/>
-            </a:pPr>
-            <a:r>
-              <a:t/>
-            </a:r>
-            <a:endParaRPr sz="1400"/>
-          </a:p>
-        </p:txBody>
-      </p:sp>
-      <p:sp>
-        <p:nvSpPr>
-          <p:cNvPr id="81" name="Shape 81"/>
-          <p:cNvSpPr txBox="1"/>
-          <p:nvPr>
-            <p:ph idx="1" type="body"/>
-          </p:nvPr>
-        </p:nvSpPr>
-        <p:spPr>
-          <a:xfrm>
-            <a:off x="4877475" y="2104375"/>
-            <a:ext cx="3981900" cy="1604100"/>
-          </a:xfrm>
-          <a:prstGeom prst="rect">
-            <a:avLst/>
-          </a:prstGeom>
-        </p:spPr>
-        <p:txBody>
-          <a:bodyPr anchorCtr="0" anchor="t" bIns="91425" lIns="91425" rIns="91425" tIns="91425">
-            <a:noAutofit/>
-          </a:bodyPr>
-          <a:lstStyle/>
-          <a:p>
-            <a:pPr lvl="0" rtl="0">
-              <a:spcBef>
-                <a:spcPts val="0"/>
-              </a:spcBef>
-              <a:spcAft>
-                <a:spcPts val="0"/>
-              </a:spcAft>
-              <a:buNone/>
-            </a:pPr>
-            <a:r>
-              <a:rPr b="1" lang="en" sz="1600"/>
-              <a:t>Has a 1:1 relation with our &lt;Position&gt; entity </a:t>
-            </a:r>
-          </a:p>
-          <a:p>
-            <a:pPr lvl="0">
-              <a:spcBef>
-                <a:spcPts val="0"/>
-              </a:spcBef>
-              <a:spcAft>
-                <a:spcPts val="0"/>
-              </a:spcAft>
-              <a:buNone/>
-            </a:pPr>
-            <a:r>
-              <a:rPr lang="en" sz="1400"/>
-              <a:t>“Every employee works one position, but every position may not be filled by an employee.” </a:t>
-            </a:r>
-          </a:p>
-        </p:txBody>
-      </p:sp>
-      <p:sp>
-        <p:nvSpPr>
-          <p:cNvPr id="82" name="Shape 82"/>
-          <p:cNvSpPr txBox="1"/>
-          <p:nvPr>
-            <p:ph idx="1" type="body"/>
-          </p:nvPr>
-        </p:nvSpPr>
-        <p:spPr>
-          <a:xfrm>
-            <a:off x="4877475" y="3925529"/>
-            <a:ext cx="3981900" cy="1033800"/>
-          </a:xfrm>
-          <a:prstGeom prst="rect">
-            <a:avLst/>
-          </a:prstGeom>
-        </p:spPr>
-        <p:txBody>
-          <a:bodyPr anchorCtr="0" anchor="t" bIns="91425" lIns="91425" rIns="91425" tIns="91425">
-            <a:noAutofit/>
-          </a:bodyPr>
-          <a:lstStyle/>
-          <a:p>
-            <a:pPr indent="-317500" lvl="0" marL="457200">
-              <a:spcBef>
-                <a:spcPts val="0"/>
-              </a:spcBef>
-              <a:spcAft>
-                <a:spcPts val="0"/>
-              </a:spcAft>
-              <a:buSzPct val="100000"/>
-              <a:buChar char="●"/>
-            </a:pPr>
-            <a:r>
-              <a:rPr b="1" lang="en" sz="1400"/>
-              <a:t>Partial Participation</a:t>
-            </a:r>
-          </a:p>
-        </p:txBody>
-      </p:sp>
-      <p:pic>
-        <p:nvPicPr>
-          <p:cNvPr id="83" name="Shape 83"/>
-          <p:cNvPicPr preferRelativeResize="0"/>
-          <p:nvPr/>
-        </p:nvPicPr>
-        <p:blipFill>
-          <a:blip r:embed="rId3">
-            <a:alphaModFix/>
-          </a:blip>
-          <a:stretch>
-            <a:fillRect/>
-          </a:stretch>
-        </p:blipFill>
-        <p:spPr>
-          <a:xfrm>
-            <a:off x="74950" y="1442799"/>
-            <a:ext cx="4440825" cy="2257899"/>
-          </a:xfrm>
-          <a:prstGeom prst="rect">
-            <a:avLst/>
-          </a:prstGeom>
-          <a:noFill/>
-          <a:ln>
-            <a:noFill/>
-          </a:ln>
-        </p:spPr>
-      </p:pic>
     </p:spTree>
   </p:cSld>
   <p:clrMapOvr>
@@ -6096,7 +7054,7 @@
   <p:cSld>
     <p:spTree>
       <p:nvGrpSpPr>
-        <p:cNvPr id="87" name="Shape 87"/>
+        <p:cNvPr id="83" name="Shape 83"/>
         <p:cNvGrpSpPr/>
         <p:nvPr/>
       </p:nvGrpSpPr>
@@ -6110,7 +7068,7 @@
       </p:grpSpPr>
       <p:sp>
         <p:nvSpPr>
-          <p:cNvPr id="88" name="Shape 88"/>
+          <p:cNvPr id="84" name="Shape 84"/>
           <p:cNvSpPr txBox="1"/>
           <p:nvPr>
             <p:ph type="title"/>
@@ -6119,7 +7077,7 @@
         <p:spPr>
           <a:xfrm>
             <a:off x="4877475" y="296900"/>
-            <a:ext cx="3981900" cy="629100"/>
+            <a:ext cx="3981899" cy="629100"/>
           </a:xfrm>
           <a:prstGeom prst="rect">
             <a:avLst/>
@@ -6131,7 +7089,7 @@
           </a:bodyPr>
           <a:lstStyle/>
           <a:p>
-            <a:pPr lvl="0" rtl="0">
+            <a:pPr lvl="0">
               <a:spcBef>
                 <a:spcPts val="0"/>
               </a:spcBef>
@@ -6139,14 +7097,14 @@
             </a:pPr>
             <a:r>
               <a:rPr lang="en" sz="3600"/>
-              <a:t>&lt;Position&gt;</a:t>
+              <a:t>&lt;Employee&gt; </a:t>
             </a:r>
           </a:p>
         </p:txBody>
       </p:sp>
       <p:sp>
         <p:nvSpPr>
-          <p:cNvPr id="89" name="Shape 89"/>
+          <p:cNvPr id="85" name="Shape 85"/>
           <p:cNvSpPr txBox="1"/>
           <p:nvPr>
             <p:ph idx="1" type="body"/>
@@ -6155,7 +7113,7 @@
         <p:spPr>
           <a:xfrm>
             <a:off x="4877475" y="1275625"/>
-            <a:ext cx="3981900" cy="1033800"/>
+            <a:ext cx="3981899" cy="1033799"/>
           </a:xfrm>
           <a:prstGeom prst="rect">
             <a:avLst/>
@@ -6167,7 +7125,7 @@
           </a:bodyPr>
           <a:lstStyle/>
           <a:p>
-            <a:pPr lvl="0" rtl="0">
+            <a:pPr lvl="0">
               <a:spcBef>
                 <a:spcPts val="0"/>
               </a:spcBef>
@@ -6178,11 +7136,11 @@
             </a:pPr>
             <a:r>
               <a:rPr b="1" lang="en" sz="1600"/>
-              <a:t>Identifying role within the company</a:t>
-            </a:r>
-          </a:p>
-          <a:p>
-            <a:pPr lvl="0" rtl="0">
+              <a:t>Workers that make up the company</a:t>
+            </a:r>
+          </a:p>
+          <a:p>
+            <a:pPr lvl="0">
               <a:spcBef>
                 <a:spcPts val="0"/>
               </a:spcBef>
@@ -6200,7 +7158,7 @@
       </p:sp>
       <p:sp>
         <p:nvSpPr>
-          <p:cNvPr id="90" name="Shape 90"/>
+          <p:cNvPr id="86" name="Shape 86"/>
           <p:cNvSpPr txBox="1"/>
           <p:nvPr>
             <p:ph idx="1" type="body"/>
@@ -6232,11 +7190,11 @@
             </a:pPr>
             <a:r>
               <a:rPr b="1" lang="en" sz="1600"/>
-              <a:t>Has an N:1 relation with our &lt;Department&gt; entity </a:t>
-            </a:r>
-          </a:p>
-          <a:p>
-            <a:pPr lvl="0" rtl="0">
+              <a:t>Has a 1:1 relation with our &lt;Position&gt; entity </a:t>
+            </a:r>
+          </a:p>
+          <a:p>
+            <a:pPr lvl="0">
               <a:spcBef>
                 <a:spcPts val="0"/>
               </a:spcBef>
@@ -6247,14 +7205,14 @@
             </a:pPr>
             <a:r>
               <a:rPr lang="en" sz="1400"/>
-              <a:t>“Individual departments can have many positions” </a:t>
+              <a:t>“Every employee works one position, but every position may not be filled by an employee.” </a:t>
             </a:r>
           </a:p>
         </p:txBody>
       </p:sp>
       <p:sp>
         <p:nvSpPr>
-          <p:cNvPr id="91" name="Shape 91"/>
+          <p:cNvPr id="87" name="Shape 87"/>
           <p:cNvSpPr txBox="1"/>
           <p:nvPr>
             <p:ph idx="1" type="body"/>
@@ -6275,7 +7233,7 @@
           </a:bodyPr>
           <a:lstStyle/>
           <a:p>
-            <a:pPr indent="-317500" lvl="0" marL="457200" rtl="0">
+            <a:pPr indent="-317500" lvl="0" marL="457200">
               <a:spcBef>
                 <a:spcPts val="0"/>
               </a:spcBef>
@@ -6287,14 +7245,14 @@
             </a:pPr>
             <a:r>
               <a:rPr b="1" lang="en" sz="1400"/>
-              <a:t>Full Participation</a:t>
+              <a:t>Partial Participation</a:t>
             </a:r>
           </a:p>
         </p:txBody>
       </p:sp>
       <p:pic>
         <p:nvPicPr>
-          <p:cNvPr id="92" name="Shape 92"/>
+          <p:cNvPr id="88" name="Shape 88"/>
           <p:cNvPicPr preferRelativeResize="0"/>
           <p:nvPr/>
         </p:nvPicPr>
@@ -6308,8 +7266,8 @@
         </p:blipFill>
         <p:spPr>
           <a:xfrm>
-            <a:off x="149950" y="926000"/>
-            <a:ext cx="4393725" cy="3752624"/>
+            <a:off x="152400" y="152400"/>
+            <a:ext cx="4572675" cy="3471175"/>
           </a:xfrm>
           <a:prstGeom prst="rect">
             <a:avLst/>
@@ -6333,7 +7291,7 @@
   <p:cSld>
     <p:spTree>
       <p:nvGrpSpPr>
-        <p:cNvPr id="96" name="Shape 96"/>
+        <p:cNvPr id="92" name="Shape 92"/>
         <p:cNvGrpSpPr/>
         <p:nvPr/>
       </p:nvGrpSpPr>
@@ -6347,7 +7305,7 @@
       </p:grpSpPr>
       <p:sp>
         <p:nvSpPr>
-          <p:cNvPr id="97" name="Shape 97"/>
+          <p:cNvPr id="93" name="Shape 93"/>
           <p:cNvSpPr txBox="1"/>
           <p:nvPr>
             <p:ph type="title"/>
@@ -6376,14 +7334,14 @@
             </a:pPr>
             <a:r>
               <a:rPr lang="en" sz="3600"/>
-              <a:t>&lt;Salary&gt;</a:t>
+              <a:t>&lt;Position&gt;</a:t>
             </a:r>
           </a:p>
         </p:txBody>
       </p:sp>
       <p:sp>
         <p:nvSpPr>
-          <p:cNvPr id="98" name="Shape 98"/>
+          <p:cNvPr id="94" name="Shape 94"/>
           <p:cNvSpPr txBox="1"/>
           <p:nvPr>
             <p:ph idx="1" type="body"/>
@@ -6415,7 +7373,7 @@
             </a:pPr>
             <a:r>
               <a:rPr b="1" lang="en" sz="1600"/>
-              <a:t>Initial income provided by work position</a:t>
+              <a:t>Identifying role within the company</a:t>
             </a:r>
           </a:p>
           <a:p>
@@ -6437,7 +7395,7 @@
       </p:sp>
       <p:sp>
         <p:nvSpPr>
-          <p:cNvPr id="99" name="Shape 99"/>
+          <p:cNvPr id="95" name="Shape 95"/>
           <p:cNvSpPr txBox="1"/>
           <p:nvPr>
             <p:ph idx="1" type="body"/>
@@ -6469,7 +7427,7 @@
             </a:pPr>
             <a:r>
               <a:rPr b="1" lang="en" sz="1600"/>
-              <a:t>Has an M:N relation with our &lt;Position&gt; entity </a:t>
+              <a:t>Has an N:1 relation with our &lt;Department&gt; entity </a:t>
             </a:r>
           </a:p>
           <a:p>
@@ -6484,14 +7442,14 @@
             </a:pPr>
             <a:r>
               <a:rPr lang="en" sz="1400"/>
-              <a:t>“There can be one, or numerous positions that have the same, or different, salaries.” </a:t>
+              <a:t>“Individual departments can have many positions” </a:t>
             </a:r>
           </a:p>
         </p:txBody>
       </p:sp>
       <p:sp>
         <p:nvSpPr>
-          <p:cNvPr id="100" name="Shape 100"/>
+          <p:cNvPr id="96" name="Shape 96"/>
           <p:cNvSpPr txBox="1"/>
           <p:nvPr>
             <p:ph idx="1" type="body"/>
@@ -6531,7 +7489,7 @@
       </p:sp>
       <p:pic>
         <p:nvPicPr>
-          <p:cNvPr id="101" name="Shape 101"/>
+          <p:cNvPr id="97" name="Shape 97"/>
           <p:cNvPicPr preferRelativeResize="0"/>
           <p:nvPr/>
         </p:nvPicPr>
@@ -6545,8 +7503,8 @@
         </p:blipFill>
         <p:spPr>
           <a:xfrm>
-            <a:off x="152400" y="152400"/>
-            <a:ext cx="4572675" cy="3867864"/>
+            <a:off x="264446" y="196725"/>
+            <a:ext cx="4335674" cy="4314825"/>
           </a:xfrm>
           <a:prstGeom prst="rect">
             <a:avLst/>
@@ -6570,7 +7528,7 @@
   <p:cSld>
     <p:spTree>
       <p:nvGrpSpPr>
-        <p:cNvPr id="105" name="Shape 105"/>
+        <p:cNvPr id="101" name="Shape 101"/>
         <p:cNvGrpSpPr/>
         <p:nvPr/>
       </p:nvGrpSpPr>
@@ -6584,7 +7542,7 @@
       </p:grpSpPr>
       <p:sp>
         <p:nvSpPr>
-          <p:cNvPr id="106" name="Shape 106"/>
+          <p:cNvPr id="102" name="Shape 102"/>
           <p:cNvSpPr txBox="1"/>
           <p:nvPr>
             <p:ph type="title"/>
@@ -6613,14 +7571,14 @@
             </a:pPr>
             <a:r>
               <a:rPr lang="en" sz="3600"/>
-              <a:t>&lt;Departments&gt;</a:t>
+              <a:t>&lt;Salary&gt;</a:t>
             </a:r>
           </a:p>
         </p:txBody>
       </p:sp>
       <p:sp>
         <p:nvSpPr>
-          <p:cNvPr id="107" name="Shape 107"/>
+          <p:cNvPr id="103" name="Shape 103"/>
           <p:cNvSpPr txBox="1"/>
           <p:nvPr>
             <p:ph idx="1" type="body"/>
@@ -6652,7 +7610,7 @@
             </a:pPr>
             <a:r>
               <a:rPr b="1" lang="en" sz="1600"/>
-              <a:t>Specified divisions that focus on different production aspects of a company</a:t>
+              <a:t>Initial income provided by work position</a:t>
             </a:r>
           </a:p>
           <a:p>
@@ -6674,7 +7632,7 @@
       </p:sp>
       <p:sp>
         <p:nvSpPr>
-          <p:cNvPr id="108" name="Shape 108"/>
+          <p:cNvPr id="104" name="Shape 104"/>
           <p:cNvSpPr txBox="1"/>
           <p:nvPr>
             <p:ph idx="1" type="body"/>
@@ -6682,7 +7640,7 @@
         </p:nvSpPr>
         <p:spPr>
           <a:xfrm>
-            <a:off x="4877475" y="2309425"/>
+            <a:off x="4877475" y="2104375"/>
             <a:ext cx="3981900" cy="1604100"/>
           </a:xfrm>
           <a:prstGeom prst="rect">
@@ -6706,7 +7664,7 @@
             </a:pPr>
             <a:r>
               <a:rPr b="1" lang="en" sz="1600"/>
-              <a:t>Has an N:1 relation with our &lt;Store&gt; entity </a:t>
+              <a:t>Has a 1:1 relation with our &lt;Position&gt; entity </a:t>
             </a:r>
           </a:p>
           <a:p>
@@ -6721,22 +7679,14 @@
             </a:pPr>
             <a:r>
               <a:rPr lang="en" sz="1400"/>
-              <a:t>“V</a:t>
-            </a:r>
-            <a:r>
-              <a:rPr lang="en" sz="1400"/>
-              <a:t>arious amounts of departments can be considered for each store.</a:t>
-            </a:r>
-            <a:r>
-              <a:rPr lang="en" sz="1400"/>
-              <a:t>” </a:t>
+              <a:t>“Positions will be mapped to a base salary until it is deemed negotiable or non-negotiable by human resources”</a:t>
             </a:r>
           </a:p>
         </p:txBody>
       </p:sp>
       <p:sp>
         <p:nvSpPr>
-          <p:cNvPr id="109" name="Shape 109"/>
+          <p:cNvPr id="105" name="Shape 105"/>
           <p:cNvSpPr txBox="1"/>
           <p:nvPr>
             <p:ph idx="1" type="body"/>
@@ -6769,18 +7719,14 @@
             </a:pPr>
             <a:r>
               <a:rPr b="1" lang="en" sz="1400"/>
-              <a:t>Full </a:t>
-            </a:r>
-            <a:r>
-              <a:rPr b="1" lang="en" sz="1400"/>
-              <a:t>Participation</a:t>
+              <a:t>Full Participation</a:t>
             </a:r>
           </a:p>
         </p:txBody>
       </p:sp>
       <p:pic>
         <p:nvPicPr>
-          <p:cNvPr id="110" name="Shape 110"/>
+          <p:cNvPr id="106" name="Shape 106"/>
           <p:cNvPicPr preferRelativeResize="0"/>
           <p:nvPr/>
         </p:nvPicPr>
@@ -6794,8 +7740,8 @@
         </p:blipFill>
         <p:spPr>
           <a:xfrm>
-            <a:off x="161775" y="114925"/>
-            <a:ext cx="4476750" cy="4743450"/>
+            <a:off x="152400" y="152400"/>
+            <a:ext cx="4572675" cy="3501362"/>
           </a:xfrm>
           <a:prstGeom prst="rect">
             <a:avLst/>
@@ -6819,7 +7765,7 @@
   <p:cSld>
     <p:spTree>
       <p:nvGrpSpPr>
-        <p:cNvPr id="114" name="Shape 114"/>
+        <p:cNvPr id="110" name="Shape 110"/>
         <p:cNvGrpSpPr/>
         <p:nvPr/>
       </p:nvGrpSpPr>
@@ -6833,7 +7779,7 @@
       </p:grpSpPr>
       <p:sp>
         <p:nvSpPr>
-          <p:cNvPr id="115" name="Shape 115"/>
+          <p:cNvPr id="111" name="Shape 111"/>
           <p:cNvSpPr txBox="1"/>
           <p:nvPr>
             <p:ph type="title"/>
@@ -6862,14 +7808,14 @@
             </a:pPr>
             <a:r>
               <a:rPr lang="en" sz="3600"/>
-              <a:t>&lt;Store&gt;</a:t>
+              <a:t>&lt;Departments&gt;</a:t>
             </a:r>
           </a:p>
         </p:txBody>
       </p:sp>
       <p:sp>
         <p:nvSpPr>
-          <p:cNvPr id="116" name="Shape 116"/>
+          <p:cNvPr id="112" name="Shape 112"/>
           <p:cNvSpPr txBox="1"/>
           <p:nvPr>
             <p:ph idx="1" type="body"/>
@@ -6901,7 +7847,7 @@
             </a:pPr>
             <a:r>
               <a:rPr b="1" lang="en" sz="1600"/>
-              <a:t>The location where each employee,position, and department are located.</a:t>
+              <a:t>Specified divisions that focus on different production aspects of a company</a:t>
             </a:r>
           </a:p>
           <a:p>
@@ -6923,7 +7869,7 @@
       </p:sp>
       <p:sp>
         <p:nvSpPr>
-          <p:cNvPr id="117" name="Shape 117"/>
+          <p:cNvPr id="113" name="Shape 113"/>
           <p:cNvSpPr txBox="1"/>
           <p:nvPr>
             <p:ph idx="1" type="body"/>
@@ -6955,7 +7901,7 @@
             </a:pPr>
             <a:r>
               <a:rPr b="1" lang="en" sz="1600"/>
-              <a:t>Has an 1:N relation with our &lt;Department&gt; entity </a:t>
+              <a:t>Has an N:1 relation with our &lt;Store&gt; entity </a:t>
             </a:r>
           </a:p>
           <a:p>
@@ -6970,14 +7916,22 @@
             </a:pPr>
             <a:r>
               <a:rPr lang="en" sz="1400"/>
-              <a:t>“Individual stores can have many departments.” </a:t>
+              <a:t>“V</a:t>
+            </a:r>
+            <a:r>
+              <a:rPr lang="en" sz="1400"/>
+              <a:t>arious amounts of departments can be considered for each store.</a:t>
+            </a:r>
+            <a:r>
+              <a:rPr lang="en" sz="1400"/>
+              <a:t>” </a:t>
             </a:r>
           </a:p>
         </p:txBody>
       </p:sp>
       <p:sp>
         <p:nvSpPr>
-          <p:cNvPr id="118" name="Shape 118"/>
+          <p:cNvPr id="114" name="Shape 114"/>
           <p:cNvSpPr txBox="1"/>
           <p:nvPr>
             <p:ph idx="1" type="body"/>
@@ -7006,7 +7960,6 @@
                 <a:spcPts val="0"/>
               </a:spcAft>
               <a:buSzPct val="100000"/>
-              <a:buChar char="●"/>
             </a:pPr>
             <a:r>
               <a:rPr b="1" lang="en" sz="1400"/>
@@ -7021,7 +7974,7 @@
       </p:sp>
       <p:pic>
         <p:nvPicPr>
-          <p:cNvPr id="119" name="Shape 119"/>
+          <p:cNvPr id="115" name="Shape 115"/>
           <p:cNvPicPr preferRelativeResize="0"/>
           <p:nvPr/>
         </p:nvPicPr>
@@ -7035,8 +7988,8 @@
         </p:blipFill>
         <p:spPr>
           <a:xfrm>
-            <a:off x="152400" y="152400"/>
-            <a:ext cx="4000500" cy="4481249"/>
+            <a:off x="65575" y="131200"/>
+            <a:ext cx="4571525" cy="4365874"/>
           </a:xfrm>
           <a:prstGeom prst="rect">
             <a:avLst/>

</xml_diff>

<commit_message>
added salary entity to relationships
</commit_message>
<xml_diff>
--- a/05 Team/ER Presentation/Team Presentation .pptx
+++ b/05 Team/ER Presentation/Team Presentation .pptx
@@ -6727,6 +6727,96 @@
                 <a:cs typeface="Source Code Pro"/>
                 <a:sym typeface="Source Code Pro"/>
               </a:rPr>
+              <a:t>, </a:t>
+            </a:r>
+            <a:r>
+              <a:rPr lang="en" sz="1800">
+                <a:solidFill>
+                  <a:schemeClr val="dk2"/>
+                </a:solidFill>
+                <a:highlight>
+                  <a:srgbClr val="F1C232"/>
+                </a:highlight>
+                <a:latin typeface="Source Code Pro"/>
+                <a:ea typeface="Source Code Pro"/>
+                <a:cs typeface="Source Code Pro"/>
+                <a:sym typeface="Source Code Pro"/>
+              </a:rPr>
+              <a:t>Salary</a:t>
+            </a:r>
+            <a:r>
+              <a:rPr b="0" lang="en" sz="1800">
+                <a:solidFill>
+                  <a:schemeClr val="dk2"/>
+                </a:solidFill>
+                <a:highlight>
+                  <a:srgbClr val="F1C232"/>
+                </a:highlight>
+                <a:latin typeface="Source Code Pro"/>
+                <a:ea typeface="Source Code Pro"/>
+                <a:cs typeface="Source Code Pro"/>
+                <a:sym typeface="Source Code Pro"/>
+              </a:rPr>
+              <a:t> </a:t>
+            </a:r>
+            <a:r>
+              <a:rPr b="0" lang="en" sz="1800" u="sng">
+                <a:solidFill>
+                  <a:schemeClr val="dk2"/>
+                </a:solidFill>
+                <a:highlight>
+                  <a:srgbClr val="F1C232"/>
+                </a:highlight>
+                <a:latin typeface="Source Code Pro"/>
+                <a:ea typeface="Source Code Pro"/>
+                <a:cs typeface="Source Code Pro"/>
+                <a:sym typeface="Source Code Pro"/>
+              </a:rPr>
+              <a:t>offered by</a:t>
+            </a:r>
+            <a:r>
+              <a:rPr b="0" lang="en" sz="1800">
+                <a:solidFill>
+                  <a:schemeClr val="dk2"/>
+                </a:solidFill>
+                <a:highlight>
+                  <a:srgbClr val="F1C232"/>
+                </a:highlight>
+                <a:latin typeface="Source Code Pro"/>
+                <a:ea typeface="Source Code Pro"/>
+                <a:cs typeface="Source Code Pro"/>
+                <a:sym typeface="Source Code Pro"/>
+              </a:rPr>
+              <a:t> </a:t>
+            </a:r>
+            <a:r>
+              <a:rPr lang="en" sz="1800">
+                <a:solidFill>
+                  <a:schemeClr val="dk2"/>
+                </a:solidFill>
+                <a:highlight>
+                  <a:srgbClr val="F1C232"/>
+                </a:highlight>
+                <a:latin typeface="Source Code Pro"/>
+                <a:ea typeface="Source Code Pro"/>
+                <a:cs typeface="Source Code Pro"/>
+                <a:sym typeface="Source Code Pro"/>
+              </a:rPr>
+              <a:t>Positions</a:t>
+            </a:r>
+            <a:r>
+              <a:rPr b="0" lang="en" sz="1800">
+                <a:solidFill>
+                  <a:schemeClr val="dk2"/>
+                </a:solidFill>
+                <a:highlight>
+                  <a:srgbClr val="F1C232"/>
+                </a:highlight>
+                <a:latin typeface="Source Code Pro"/>
+                <a:ea typeface="Source Code Pro"/>
+                <a:cs typeface="Source Code Pro"/>
+                <a:sym typeface="Source Code Pro"/>
+              </a:rPr>
               <a:t>, and </a:t>
             </a:r>
             <a:r>
@@ -6958,7 +7048,7 @@
             </a:pPr>
             <a:r>
               <a:rPr lang="en"/>
-              <a:t>Shenila Daredia- Frontend/back-end/client</a:t>
+              <a:t>Shenila Daredia- Frontend/back-end</a:t>
             </a:r>
           </a:p>
           <a:p>
@@ -8009,6 +8099,285 @@
 </file>
 
 <file path=ppt/theme/theme1.xml><?xml version="1.0" encoding="utf-8"?>
+<a:theme xmlns:a="http://schemas.openxmlformats.org/drawingml/2006/main" xmlns:r="http://schemas.openxmlformats.org/officeDocument/2006/relationships" name="beach-day">
+  <a:themeElements>
+    <a:clrScheme name="Beach Day">
+      <a:dk1>
+        <a:srgbClr val="00FDC8"/>
+      </a:dk1>
+      <a:lt1>
+        <a:srgbClr val="FFFFFF"/>
+      </a:lt1>
+      <a:dk2>
+        <a:srgbClr val="666666"/>
+      </a:dk2>
+      <a:lt2>
+        <a:srgbClr val="EEEEEE"/>
+      </a:lt2>
+      <a:accent1>
+        <a:srgbClr val="212121"/>
+      </a:accent1>
+      <a:accent2>
+        <a:srgbClr val="455A64"/>
+      </a:accent2>
+      <a:accent3>
+        <a:srgbClr val="78909C"/>
+      </a:accent3>
+      <a:accent4>
+        <a:srgbClr val="7C7CE0"/>
+      </a:accent4>
+      <a:accent5>
+        <a:srgbClr val="DB4437"/>
+      </a:accent5>
+      <a:accent6>
+        <a:srgbClr val="F6CD4C"/>
+      </a:accent6>
+      <a:hlink>
+        <a:srgbClr val="DB4437"/>
+      </a:hlink>
+      <a:folHlink>
+        <a:srgbClr val="DB4437"/>
+      </a:folHlink>
+    </a:clrScheme>
+    <a:fontScheme name="Office">
+      <a:majorFont>
+        <a:latin typeface="Arial"/>
+        <a:ea typeface=""/>
+        <a:cs typeface=""/>
+        <a:font script="Jpan" typeface="ＭＳ Ｐゴシック"/>
+        <a:font script="Hang" typeface="맑은 고딕"/>
+        <a:font script="Hans" typeface="宋体"/>
+        <a:font script="Hant" typeface="新細明體"/>
+        <a:font script="Arab" typeface="Times New Roman"/>
+        <a:font script="Hebr" typeface="Times New Roman"/>
+        <a:font script="Thai" typeface="Angsana New"/>
+        <a:font script="Ethi" typeface="Nyala"/>
+        <a:font script="Beng" typeface="Vrinda"/>
+        <a:font script="Gujr" typeface="Shruti"/>
+        <a:font script="Khmr" typeface="MoolBoran"/>
+        <a:font script="Knda" typeface="Tunga"/>
+        <a:font script="Guru" typeface="Raavi"/>
+        <a:font script="Cans" typeface="Euphemia"/>
+        <a:font script="Cher" typeface="Plantagenet Cherokee"/>
+        <a:font script="Yiii" typeface="Microsoft Yi Baiti"/>
+        <a:font script="Tibt" typeface="Microsoft Himalaya"/>
+        <a:font script="Thaa" typeface="MV Boli"/>
+        <a:font script="Deva" typeface="Mangal"/>
+        <a:font script="Telu" typeface="Gautami"/>
+        <a:font script="Taml" typeface="Latha"/>
+        <a:font script="Syrc" typeface="Estrangelo Edessa"/>
+        <a:font script="Orya" typeface="Kalinga"/>
+        <a:font script="Mlym" typeface="Kartika"/>
+        <a:font script="Laoo" typeface="DokChampa"/>
+        <a:font script="Sinh" typeface="Iskoola Pota"/>
+        <a:font script="Mong" typeface="Mongolian Baiti"/>
+        <a:font script="Viet" typeface="Times New Roman"/>
+        <a:font script="Uigh" typeface="Microsoft Uighur"/>
+        <a:font script="Geor" typeface="Sylfaen"/>
+      </a:majorFont>
+      <a:minorFont>
+        <a:latin typeface="Arial"/>
+        <a:ea typeface=""/>
+        <a:cs typeface=""/>
+        <a:font script="Jpan" typeface="ＭＳ Ｐゴシック"/>
+        <a:font script="Hang" typeface="맑은 고딕"/>
+        <a:font script="Hans" typeface="宋体"/>
+        <a:font script="Hant" typeface="新細明體"/>
+        <a:font script="Arab" typeface="Arial"/>
+        <a:font script="Hebr" typeface="Arial"/>
+        <a:font script="Thai" typeface="Cordia New"/>
+        <a:font script="Ethi" typeface="Nyala"/>
+        <a:font script="Beng" typeface="Vrinda"/>
+        <a:font script="Gujr" typeface="Shruti"/>
+        <a:font script="Khmr" typeface="DaunPenh"/>
+        <a:font script="Knda" typeface="Tunga"/>
+        <a:font script="Guru" typeface="Raavi"/>
+        <a:font script="Cans" typeface="Euphemia"/>
+        <a:font script="Cher" typeface="Plantagenet Cherokee"/>
+        <a:font script="Yiii" typeface="Microsoft Yi Baiti"/>
+        <a:font script="Tibt" typeface="Microsoft Himalaya"/>
+        <a:font script="Thaa" typeface="MV Boli"/>
+        <a:font script="Deva" typeface="Mangal"/>
+        <a:font script="Telu" typeface="Gautami"/>
+        <a:font script="Taml" typeface="Latha"/>
+        <a:font script="Syrc" typeface="Estrangelo Edessa"/>
+        <a:font script="Orya" typeface="Kalinga"/>
+        <a:font script="Mlym" typeface="Kartika"/>
+        <a:font script="Laoo" typeface="DokChampa"/>
+        <a:font script="Sinh" typeface="Iskoola Pota"/>
+        <a:font script="Mong" typeface="Mongolian Baiti"/>
+        <a:font script="Viet" typeface="Arial"/>
+        <a:font script="Uigh" typeface="Microsoft Uighur"/>
+        <a:font script="Geor" typeface="Sylfaen"/>
+      </a:minorFont>
+    </a:fontScheme>
+    <a:fmtScheme name="Office">
+      <a:fillStyleLst>
+        <a:solidFill>
+          <a:schemeClr val="phClr"/>
+        </a:solidFill>
+        <a:gradFill rotWithShape="1">
+          <a:gsLst>
+            <a:gs pos="0">
+              <a:schemeClr val="phClr">
+                <a:tint val="50000"/>
+                <a:satMod val="300000"/>
+              </a:schemeClr>
+            </a:gs>
+            <a:gs pos="35000">
+              <a:schemeClr val="phClr">
+                <a:tint val="37000"/>
+                <a:satMod val="300000"/>
+              </a:schemeClr>
+            </a:gs>
+            <a:gs pos="100000">
+              <a:schemeClr val="phClr">
+                <a:tint val="15000"/>
+                <a:satMod val="350000"/>
+              </a:schemeClr>
+            </a:gs>
+          </a:gsLst>
+          <a:lin ang="16200000" scaled="1"/>
+        </a:gradFill>
+        <a:gradFill rotWithShape="1">
+          <a:gsLst>
+            <a:gs pos="0">
+              <a:schemeClr val="phClr">
+                <a:tint val="100000"/>
+                <a:shade val="100000"/>
+                <a:satMod val="130000"/>
+              </a:schemeClr>
+            </a:gs>
+            <a:gs pos="100000">
+              <a:schemeClr val="phClr">
+                <a:tint val="50000"/>
+                <a:shade val="100000"/>
+                <a:satMod val="350000"/>
+              </a:schemeClr>
+            </a:gs>
+          </a:gsLst>
+          <a:lin ang="16200000" scaled="0"/>
+        </a:gradFill>
+      </a:fillStyleLst>
+      <a:lnStyleLst>
+        <a:ln w="9525" cap="flat" cmpd="sng" algn="ctr">
+          <a:solidFill>
+            <a:schemeClr val="phClr">
+              <a:shade val="95000"/>
+              <a:satMod val="105000"/>
+            </a:schemeClr>
+          </a:solidFill>
+          <a:prstDash val="solid"/>
+        </a:ln>
+        <a:ln w="25400" cap="flat" cmpd="sng" algn="ctr">
+          <a:solidFill>
+            <a:schemeClr val="phClr"/>
+          </a:solidFill>
+          <a:prstDash val="solid"/>
+        </a:ln>
+        <a:ln w="38100" cap="flat" cmpd="sng" algn="ctr">
+          <a:solidFill>
+            <a:schemeClr val="phClr"/>
+          </a:solidFill>
+          <a:prstDash val="solid"/>
+        </a:ln>
+      </a:lnStyleLst>
+      <a:effectStyleLst>
+        <a:effectStyle>
+          <a:effectLst>
+            <a:outerShdw blurRad="40000" dist="20000" dir="5400000" rotWithShape="0">
+              <a:srgbClr val="000000">
+                <a:alpha val="38000"/>
+              </a:srgbClr>
+            </a:outerShdw>
+          </a:effectLst>
+        </a:effectStyle>
+        <a:effectStyle>
+          <a:effectLst>
+            <a:outerShdw blurRad="40000" dist="23000" dir="5400000" rotWithShape="0">
+              <a:srgbClr val="000000">
+                <a:alpha val="35000"/>
+              </a:srgbClr>
+            </a:outerShdw>
+          </a:effectLst>
+        </a:effectStyle>
+        <a:effectStyle>
+          <a:effectLst>
+            <a:outerShdw blurRad="40000" dist="23000" dir="5400000" rotWithShape="0">
+              <a:srgbClr val="000000">
+                <a:alpha val="35000"/>
+              </a:srgbClr>
+            </a:outerShdw>
+          </a:effectLst>
+          <a:scene3d>
+            <a:camera prst="orthographicFront">
+              <a:rot lat="0" lon="0" rev="0"/>
+            </a:camera>
+            <a:lightRig rig="threePt" dir="t">
+              <a:rot lat="0" lon="0" rev="1200000"/>
+            </a:lightRig>
+          </a:scene3d>
+          <a:sp3d>
+            <a:bevelT w="63500" h="25400"/>
+          </a:sp3d>
+        </a:effectStyle>
+      </a:effectStyleLst>
+      <a:bgFillStyleLst>
+        <a:solidFill>
+          <a:schemeClr val="phClr"/>
+        </a:solidFill>
+        <a:gradFill rotWithShape="1">
+          <a:gsLst>
+            <a:gs pos="0">
+              <a:schemeClr val="phClr">
+                <a:tint val="40000"/>
+                <a:satMod val="350000"/>
+              </a:schemeClr>
+            </a:gs>
+            <a:gs pos="40000">
+              <a:schemeClr val="phClr">
+                <a:tint val="45000"/>
+                <a:shade val="99000"/>
+                <a:satMod val="350000"/>
+              </a:schemeClr>
+            </a:gs>
+            <a:gs pos="100000">
+              <a:schemeClr val="phClr">
+                <a:shade val="20000"/>
+                <a:satMod val="255000"/>
+              </a:schemeClr>
+            </a:gs>
+          </a:gsLst>
+          <a:path path="circle">
+            <a:fillToRect l="50000" t="-80000" r="50000" b="180000"/>
+          </a:path>
+        </a:gradFill>
+        <a:gradFill rotWithShape="1">
+          <a:gsLst>
+            <a:gs pos="0">
+              <a:schemeClr val="phClr">
+                <a:tint val="80000"/>
+                <a:satMod val="300000"/>
+              </a:schemeClr>
+            </a:gs>
+            <a:gs pos="100000">
+              <a:schemeClr val="phClr">
+                <a:shade val="30000"/>
+                <a:satMod val="200000"/>
+              </a:schemeClr>
+            </a:gs>
+          </a:gsLst>
+          <a:path path="circle">
+            <a:fillToRect l="50000" t="50000" r="50000" b="50000"/>
+          </a:path>
+        </a:gradFill>
+      </a:bgFillStyleLst>
+    </a:fmtScheme>
+  </a:themeElements>
+</a:theme>
+</file>
+
+<file path=ppt/theme/theme2.xml><?xml version="1.0" encoding="utf-8"?>
 <a:theme xmlns:a="http://schemas.openxmlformats.org/drawingml/2006/main" xmlns:r="http://schemas.openxmlformats.org/officeDocument/2006/relationships" name="Custom Theme">
   <a:themeElements>
     <a:clrScheme name="Default">
@@ -8285,283 +8654,4 @@
     </a:fmtScheme>
   </a:themeElements>
 </a:theme>
-</file>
-
-<file path=ppt/theme/theme2.xml><?xml version="1.0" encoding="utf-8"?>
-<a:theme xmlns:a="http://schemas.openxmlformats.org/drawingml/2006/main" xmlns:r="http://schemas.openxmlformats.org/officeDocument/2006/relationships" name="beach-day">
-  <a:themeElements>
-    <a:clrScheme name="Beach Day">
-      <a:dk1>
-        <a:srgbClr val="00FDC8"/>
-      </a:dk1>
-      <a:lt1>
-        <a:srgbClr val="FFFFFF"/>
-      </a:lt1>
-      <a:dk2>
-        <a:srgbClr val="666666"/>
-      </a:dk2>
-      <a:lt2>
-        <a:srgbClr val="EEEEEE"/>
-      </a:lt2>
-      <a:accent1>
-        <a:srgbClr val="212121"/>
-      </a:accent1>
-      <a:accent2>
-        <a:srgbClr val="455A64"/>
-      </a:accent2>
-      <a:accent3>
-        <a:srgbClr val="78909C"/>
-      </a:accent3>
-      <a:accent4>
-        <a:srgbClr val="7C7CE0"/>
-      </a:accent4>
-      <a:accent5>
-        <a:srgbClr val="DB4437"/>
-      </a:accent5>
-      <a:accent6>
-        <a:srgbClr val="F6CD4C"/>
-      </a:accent6>
-      <a:hlink>
-        <a:srgbClr val="DB4437"/>
-      </a:hlink>
-      <a:folHlink>
-        <a:srgbClr val="DB4437"/>
-      </a:folHlink>
-    </a:clrScheme>
-    <a:fontScheme name="Office">
-      <a:majorFont>
-        <a:latin typeface="Arial"/>
-        <a:ea typeface=""/>
-        <a:cs typeface=""/>
-        <a:font script="Jpan" typeface="ＭＳ Ｐゴシック"/>
-        <a:font script="Hang" typeface="맑은 고딕"/>
-        <a:font script="Hans" typeface="宋体"/>
-        <a:font script="Hant" typeface="新細明體"/>
-        <a:font script="Arab" typeface="Times New Roman"/>
-        <a:font script="Hebr" typeface="Times New Roman"/>
-        <a:font script="Thai" typeface="Angsana New"/>
-        <a:font script="Ethi" typeface="Nyala"/>
-        <a:font script="Beng" typeface="Vrinda"/>
-        <a:font script="Gujr" typeface="Shruti"/>
-        <a:font script="Khmr" typeface="MoolBoran"/>
-        <a:font script="Knda" typeface="Tunga"/>
-        <a:font script="Guru" typeface="Raavi"/>
-        <a:font script="Cans" typeface="Euphemia"/>
-        <a:font script="Cher" typeface="Plantagenet Cherokee"/>
-        <a:font script="Yiii" typeface="Microsoft Yi Baiti"/>
-        <a:font script="Tibt" typeface="Microsoft Himalaya"/>
-        <a:font script="Thaa" typeface="MV Boli"/>
-        <a:font script="Deva" typeface="Mangal"/>
-        <a:font script="Telu" typeface="Gautami"/>
-        <a:font script="Taml" typeface="Latha"/>
-        <a:font script="Syrc" typeface="Estrangelo Edessa"/>
-        <a:font script="Orya" typeface="Kalinga"/>
-        <a:font script="Mlym" typeface="Kartika"/>
-        <a:font script="Laoo" typeface="DokChampa"/>
-        <a:font script="Sinh" typeface="Iskoola Pota"/>
-        <a:font script="Mong" typeface="Mongolian Baiti"/>
-        <a:font script="Viet" typeface="Times New Roman"/>
-        <a:font script="Uigh" typeface="Microsoft Uighur"/>
-        <a:font script="Geor" typeface="Sylfaen"/>
-      </a:majorFont>
-      <a:minorFont>
-        <a:latin typeface="Arial"/>
-        <a:ea typeface=""/>
-        <a:cs typeface=""/>
-        <a:font script="Jpan" typeface="ＭＳ Ｐゴシック"/>
-        <a:font script="Hang" typeface="맑은 고딕"/>
-        <a:font script="Hans" typeface="宋体"/>
-        <a:font script="Hant" typeface="新細明體"/>
-        <a:font script="Arab" typeface="Arial"/>
-        <a:font script="Hebr" typeface="Arial"/>
-        <a:font script="Thai" typeface="Cordia New"/>
-        <a:font script="Ethi" typeface="Nyala"/>
-        <a:font script="Beng" typeface="Vrinda"/>
-        <a:font script="Gujr" typeface="Shruti"/>
-        <a:font script="Khmr" typeface="DaunPenh"/>
-        <a:font script="Knda" typeface="Tunga"/>
-        <a:font script="Guru" typeface="Raavi"/>
-        <a:font script="Cans" typeface="Euphemia"/>
-        <a:font script="Cher" typeface="Plantagenet Cherokee"/>
-        <a:font script="Yiii" typeface="Microsoft Yi Baiti"/>
-        <a:font script="Tibt" typeface="Microsoft Himalaya"/>
-        <a:font script="Thaa" typeface="MV Boli"/>
-        <a:font script="Deva" typeface="Mangal"/>
-        <a:font script="Telu" typeface="Gautami"/>
-        <a:font script="Taml" typeface="Latha"/>
-        <a:font script="Syrc" typeface="Estrangelo Edessa"/>
-        <a:font script="Orya" typeface="Kalinga"/>
-        <a:font script="Mlym" typeface="Kartika"/>
-        <a:font script="Laoo" typeface="DokChampa"/>
-        <a:font script="Sinh" typeface="Iskoola Pota"/>
-        <a:font script="Mong" typeface="Mongolian Baiti"/>
-        <a:font script="Viet" typeface="Arial"/>
-        <a:font script="Uigh" typeface="Microsoft Uighur"/>
-        <a:font script="Geor" typeface="Sylfaen"/>
-      </a:minorFont>
-    </a:fontScheme>
-    <a:fmtScheme name="Office">
-      <a:fillStyleLst>
-        <a:solidFill>
-          <a:schemeClr val="phClr"/>
-        </a:solidFill>
-        <a:gradFill rotWithShape="1">
-          <a:gsLst>
-            <a:gs pos="0">
-              <a:schemeClr val="phClr">
-                <a:tint val="50000"/>
-                <a:satMod val="300000"/>
-              </a:schemeClr>
-            </a:gs>
-            <a:gs pos="35000">
-              <a:schemeClr val="phClr">
-                <a:tint val="37000"/>
-                <a:satMod val="300000"/>
-              </a:schemeClr>
-            </a:gs>
-            <a:gs pos="100000">
-              <a:schemeClr val="phClr">
-                <a:tint val="15000"/>
-                <a:satMod val="350000"/>
-              </a:schemeClr>
-            </a:gs>
-          </a:gsLst>
-          <a:lin ang="16200000" scaled="1"/>
-        </a:gradFill>
-        <a:gradFill rotWithShape="1">
-          <a:gsLst>
-            <a:gs pos="0">
-              <a:schemeClr val="phClr">
-                <a:tint val="100000"/>
-                <a:shade val="100000"/>
-                <a:satMod val="130000"/>
-              </a:schemeClr>
-            </a:gs>
-            <a:gs pos="100000">
-              <a:schemeClr val="phClr">
-                <a:tint val="50000"/>
-                <a:shade val="100000"/>
-                <a:satMod val="350000"/>
-              </a:schemeClr>
-            </a:gs>
-          </a:gsLst>
-          <a:lin ang="16200000" scaled="0"/>
-        </a:gradFill>
-      </a:fillStyleLst>
-      <a:lnStyleLst>
-        <a:ln w="9525" cap="flat" cmpd="sng" algn="ctr">
-          <a:solidFill>
-            <a:schemeClr val="phClr">
-              <a:shade val="95000"/>
-              <a:satMod val="105000"/>
-            </a:schemeClr>
-          </a:solidFill>
-          <a:prstDash val="solid"/>
-        </a:ln>
-        <a:ln w="25400" cap="flat" cmpd="sng" algn="ctr">
-          <a:solidFill>
-            <a:schemeClr val="phClr"/>
-          </a:solidFill>
-          <a:prstDash val="solid"/>
-        </a:ln>
-        <a:ln w="38100" cap="flat" cmpd="sng" algn="ctr">
-          <a:solidFill>
-            <a:schemeClr val="phClr"/>
-          </a:solidFill>
-          <a:prstDash val="solid"/>
-        </a:ln>
-      </a:lnStyleLst>
-      <a:effectStyleLst>
-        <a:effectStyle>
-          <a:effectLst>
-            <a:outerShdw blurRad="40000" dist="20000" dir="5400000" rotWithShape="0">
-              <a:srgbClr val="000000">
-                <a:alpha val="38000"/>
-              </a:srgbClr>
-            </a:outerShdw>
-          </a:effectLst>
-        </a:effectStyle>
-        <a:effectStyle>
-          <a:effectLst>
-            <a:outerShdw blurRad="40000" dist="23000" dir="5400000" rotWithShape="0">
-              <a:srgbClr val="000000">
-                <a:alpha val="35000"/>
-              </a:srgbClr>
-            </a:outerShdw>
-          </a:effectLst>
-        </a:effectStyle>
-        <a:effectStyle>
-          <a:effectLst>
-            <a:outerShdw blurRad="40000" dist="23000" dir="5400000" rotWithShape="0">
-              <a:srgbClr val="000000">
-                <a:alpha val="35000"/>
-              </a:srgbClr>
-            </a:outerShdw>
-          </a:effectLst>
-          <a:scene3d>
-            <a:camera prst="orthographicFront">
-              <a:rot lat="0" lon="0" rev="0"/>
-            </a:camera>
-            <a:lightRig rig="threePt" dir="t">
-              <a:rot lat="0" lon="0" rev="1200000"/>
-            </a:lightRig>
-          </a:scene3d>
-          <a:sp3d>
-            <a:bevelT w="63500" h="25400"/>
-          </a:sp3d>
-        </a:effectStyle>
-      </a:effectStyleLst>
-      <a:bgFillStyleLst>
-        <a:solidFill>
-          <a:schemeClr val="phClr"/>
-        </a:solidFill>
-        <a:gradFill rotWithShape="1">
-          <a:gsLst>
-            <a:gs pos="0">
-              <a:schemeClr val="phClr">
-                <a:tint val="40000"/>
-                <a:satMod val="350000"/>
-              </a:schemeClr>
-            </a:gs>
-            <a:gs pos="40000">
-              <a:schemeClr val="phClr">
-                <a:tint val="45000"/>
-                <a:shade val="99000"/>
-                <a:satMod val="350000"/>
-              </a:schemeClr>
-            </a:gs>
-            <a:gs pos="100000">
-              <a:schemeClr val="phClr">
-                <a:shade val="20000"/>
-                <a:satMod val="255000"/>
-              </a:schemeClr>
-            </a:gs>
-          </a:gsLst>
-          <a:path path="circle">
-            <a:fillToRect l="50000" t="-80000" r="50000" b="180000"/>
-          </a:path>
-        </a:gradFill>
-        <a:gradFill rotWithShape="1">
-          <a:gsLst>
-            <a:gs pos="0">
-              <a:schemeClr val="phClr">
-                <a:tint val="80000"/>
-                <a:satMod val="300000"/>
-              </a:schemeClr>
-            </a:gs>
-            <a:gs pos="100000">
-              <a:schemeClr val="phClr">
-                <a:shade val="30000"/>
-                <a:satMod val="200000"/>
-              </a:schemeClr>
-            </a:gs>
-          </a:gsLst>
-          <a:path path="circle">
-            <a:fillToRect l="50000" t="50000" r="50000" b="50000"/>
-          </a:path>
-        </a:gradFill>
-      </a:bgFillStyleLst>
-    </a:fmtScheme>
-  </a:themeElements>
-</a:theme>
 </file>
</xml_diff>